<commit_message>
docs(phase2): publish closeout runbooks and external action register
</commit_message>
<xml_diff>
--- a/docs/project/adinsights-stakeholder-deck.pptx
+++ b/docs/project/adinsights-stakeholder-deck.pptx
@@ -762,9 +762,9 @@
           <c:layoutTarget val="inner"/>
           <c:xMode val="edge"/>
           <c:yMode val="edge"/>
-          <c:x val="0.0688672"/>
+          <c:x val="0.0693283"/>
           <c:y val="0.0533999"/>
-          <c:w val="0.926133"/>
+          <c:w val="0.925672"/>
           <c:h val="0.857799"/>
         </c:manualLayout>
       </c:layout>
@@ -990,9 +990,9 @@
           <c:layoutTarget val="inner"/>
           <c:xMode val="edge"/>
           <c:yMode val="edge"/>
-          <c:x val="0.136573"/>
+          <c:x val="0.137402"/>
           <c:y val="0.0533999"/>
-          <c:w val="0.844478"/>
+          <c:w val="0.843535"/>
           <c:h val="0.857799"/>
         </c:manualLayout>
       </c:layout>
@@ -1502,9 +1502,9 @@
           <c:layoutTarget val="inner"/>
           <c:xMode val="edge"/>
           <c:yMode val="edge"/>
-          <c:x val="0.0662993"/>
+          <c:x val="0.0667265"/>
           <c:y val="0.0533999"/>
-          <c:w val="0.896413"/>
+          <c:w val="0.895746"/>
           <c:h val="0.857799"/>
         </c:manualLayout>
       </c:layout>
@@ -4683,54 +4683,169 @@
           <a:chExt cx="0" cy="0"/>
         </a:xfrm>
       </p:grpSpPr>
-      <p:sp>
-        <p:nvSpPr>
-          <p:cNvPr id="137" name="ADinsights"/>
-          <p:cNvSpPr txBox="1"/>
-          <p:nvPr>
-            <p:ph type="ctrTitle"/>
-          </p:nvPr>
-        </p:nvSpPr>
+      <p:pic>
+        <p:nvPicPr>
+          <p:cNvPr id="137" name="header_bar.png" descr="header_bar.png"/>
+          <p:cNvPicPr>
+            <a:picLocks noChangeAspect="1"/>
+          </p:cNvPicPr>
+          <p:nvPr/>
+        </p:nvPicPr>
+        <p:blipFill>
+          <a:blip r:embed="rId2">
+            <a:extLst/>
+          </a:blip>
+          <a:stretch>
+            <a:fillRect/>
+          </a:stretch>
+        </p:blipFill>
         <p:spPr>
+          <a:xfrm>
+            <a:off x="0" y="0"/>
+            <a:ext cx="13004800" cy="1778000"/>
+          </a:xfrm>
           <a:prstGeom prst="rect">
             <a:avLst/>
           </a:prstGeom>
+          <a:ln w="12700">
+            <a:miter lim="400000"/>
+          </a:ln>
+        </p:spPr>
+      </p:pic>
+      <p:sp>
+        <p:nvSpPr>
+          <p:cNvPr id="138" name="ADtelligent - ADinsights Stakeholder Brief"/>
+          <p:cNvSpPr txBox="1"/>
+          <p:nvPr/>
+        </p:nvSpPr>
+        <p:spPr>
+          <a:xfrm>
+            <a:off x="685799" y="595808"/>
+            <a:ext cx="11684001" cy="611784"/>
+          </a:xfrm>
+          <a:prstGeom prst="rect">
+            <a:avLst/>
+          </a:prstGeom>
+          <a:ln w="12700">
+            <a:miter lim="400000"/>
+          </a:ln>
+          <a:extLst>
+            <a:ext uri="{C572A759-6A51-4108-AA02-DFA0A04FC94B}">
+              <ma14:wrappingTextBoxFlag xmlns:ma14="http://schemas.microsoft.com/office/mac/drawingml/2011/main" val="1"/>
+            </a:ext>
+          </a:extLst>
         </p:spPr>
         <p:txBody>
-          <a:bodyPr/>
-          <a:lstStyle/>
+          <a:bodyPr lIns="50800" tIns="50800" rIns="50800" bIns="50800" anchor="ctr">
+            <a:spAutoFit/>
+          </a:bodyPr>
+          <a:lstStyle>
+            <a:lvl1pPr>
+              <a:defRPr sz="4000">
+                <a:solidFill>
+                  <a:srgbClr val="FFFFFF"/>
+                </a:solidFill>
+                <a:latin typeface="Calibri"/>
+                <a:ea typeface="Calibri"/>
+                <a:cs typeface="Calibri"/>
+                <a:sym typeface="Calibri"/>
+              </a:defRPr>
+            </a:lvl1pPr>
+          </a:lstStyle>
           <a:p>
             <a:pPr/>
             <a:r>
-              <a:t>ADinsights</a:t>
+              <a:t>ADtelligent - ADinsights Stakeholder Brief</a:t>
             </a:r>
           </a:p>
         </p:txBody>
       </p:sp>
       <p:sp>
         <p:nvSpPr>
-          <p:cNvPr id="138" name="Stakeholder Briefing: Why this app matters and how it drives decisions"/>
+          <p:cNvPr id="139" name="Unified paid-media intelligence for faster, safer stakeholder decisions"/>
           <p:cNvSpPr txBox="1"/>
-          <p:nvPr>
-            <p:ph type="subTitle" sz="quarter" idx="1"/>
-          </p:nvPr>
+          <p:nvPr/>
         </p:nvSpPr>
         <p:spPr>
+          <a:xfrm>
+            <a:off x="889000" y="2775663"/>
+            <a:ext cx="11176001" cy="1078074"/>
+          </a:xfrm>
           <a:prstGeom prst="rect">
             <a:avLst/>
           </a:prstGeom>
+          <a:ln w="12700">
+            <a:miter lim="400000"/>
+          </a:ln>
+          <a:extLst>
+            <a:ext uri="{C572A759-6A51-4108-AA02-DFA0A04FC94B}">
+              <ma14:wrappingTextBoxFlag xmlns:ma14="http://schemas.microsoft.com/office/mac/drawingml/2011/main" val="1"/>
+            </a:ext>
+          </a:extLst>
         </p:spPr>
         <p:txBody>
-          <a:bodyPr/>
+          <a:bodyPr lIns="50800" tIns="50800" rIns="50800" bIns="50800" anchor="ctr">
+            <a:spAutoFit/>
+          </a:bodyPr>
           <a:lstStyle>
-            <a:lvl1pPr defTabSz="537463">
-              <a:defRPr sz="3404"/>
+            <a:lvl1pPr>
+              <a:defRPr sz="3400">
+                <a:latin typeface="Arial"/>
+                <a:ea typeface="Arial"/>
+                <a:cs typeface="Arial"/>
+                <a:sym typeface="Arial"/>
+              </a:defRPr>
             </a:lvl1pPr>
           </a:lstStyle>
           <a:p>
             <a:pPr/>
             <a:r>
-              <a:t>Stakeholder Briefing: Why this app matters and how it drives decisions</a:t>
+              <a:t>Unified paid-media intelligence for faster, safer stakeholder decisions</a:t>
+            </a:r>
+          </a:p>
+        </p:txBody>
+      </p:sp>
+      <p:sp>
+        <p:nvSpPr>
+          <p:cNvPr id="140" name="Theme: Orange + White titles, Black body text | Audience: Leadership, Account, Analyst, Ops, Security"/>
+          <p:cNvSpPr txBox="1"/>
+          <p:nvPr/>
+        </p:nvSpPr>
+        <p:spPr>
+          <a:xfrm>
+            <a:off x="889000" y="4411262"/>
+            <a:ext cx="11176000" cy="702476"/>
+          </a:xfrm>
+          <a:prstGeom prst="rect">
+            <a:avLst/>
+          </a:prstGeom>
+          <a:ln w="12700">
+            <a:miter lim="400000"/>
+          </a:ln>
+          <a:extLst>
+            <a:ext uri="{C572A759-6A51-4108-AA02-DFA0A04FC94B}">
+              <ma14:wrappingTextBoxFlag xmlns:ma14="http://schemas.microsoft.com/office/mac/drawingml/2011/main" val="1"/>
+            </a:ext>
+          </a:extLst>
+        </p:spPr>
+        <p:txBody>
+          <a:bodyPr lIns="50800" tIns="50800" rIns="50800" bIns="50800" anchor="ctr">
+            <a:spAutoFit/>
+          </a:bodyPr>
+          <a:lstStyle>
+            <a:lvl1pPr>
+              <a:defRPr sz="2100">
+                <a:latin typeface="Arial"/>
+                <a:ea typeface="Arial"/>
+                <a:cs typeface="Arial"/>
+                <a:sym typeface="Arial"/>
+              </a:defRPr>
+            </a:lvl1pPr>
+          </a:lstStyle>
+          <a:p>
+            <a:pPr/>
+            <a:r>
+              <a:t>Theme: Orange + White titles, Black body text | Audience: Leadership, Account, Analyst, Ops, Security</a:t>
             </a:r>
           </a:p>
         </p:txBody>
@@ -4761,72 +4876,144 @@
           <a:chExt cx="0" cy="0"/>
         </a:xfrm>
       </p:grpSpPr>
-      <p:sp>
-        <p:nvSpPr>
-          <p:cNvPr id="168" name="Risk Management"/>
-          <p:cNvSpPr txBox="1"/>
-          <p:nvPr>
-            <p:ph type="title"/>
-          </p:nvPr>
-        </p:nvSpPr>
+      <p:pic>
+        <p:nvPicPr>
+          <p:cNvPr id="188" name="header_bar.png" descr="header_bar.png"/>
+          <p:cNvPicPr>
+            <a:picLocks noChangeAspect="1"/>
+          </p:cNvPicPr>
+          <p:nvPr/>
+        </p:nvPicPr>
+        <p:blipFill>
+          <a:blip r:embed="rId2">
+            <a:extLst/>
+          </a:blip>
+          <a:stretch>
+            <a:fillRect/>
+          </a:stretch>
+        </p:blipFill>
         <p:spPr>
+          <a:xfrm>
+            <a:off x="0" y="0"/>
+            <a:ext cx="13004800" cy="1778000"/>
+          </a:xfrm>
           <a:prstGeom prst="rect">
             <a:avLst/>
           </a:prstGeom>
+          <a:ln w="12700">
+            <a:miter lim="400000"/>
+          </a:ln>
+        </p:spPr>
+      </p:pic>
+      <p:sp>
+        <p:nvSpPr>
+          <p:cNvPr id="189" name="Adoption Can Scale Within 90 Days"/>
+          <p:cNvSpPr txBox="1"/>
+          <p:nvPr/>
+        </p:nvSpPr>
+        <p:spPr>
+          <a:xfrm>
+            <a:off x="685799" y="595808"/>
+            <a:ext cx="11684001" cy="611784"/>
+          </a:xfrm>
+          <a:prstGeom prst="rect">
+            <a:avLst/>
+          </a:prstGeom>
+          <a:ln w="12700">
+            <a:miter lim="400000"/>
+          </a:ln>
+          <a:extLst>
+            <a:ext uri="{C572A759-6A51-4108-AA02-DFA0A04FC94B}">
+              <ma14:wrappingTextBoxFlag xmlns:ma14="http://schemas.microsoft.com/office/mac/drawingml/2011/main" val="1"/>
+            </a:ext>
+          </a:extLst>
         </p:spPr>
         <p:txBody>
-          <a:bodyPr/>
-          <a:lstStyle/>
+          <a:bodyPr lIns="50800" tIns="50800" rIns="50800" bIns="50800" anchor="ctr">
+            <a:spAutoFit/>
+          </a:bodyPr>
+          <a:lstStyle>
+            <a:lvl1pPr>
+              <a:defRPr sz="4000">
+                <a:solidFill>
+                  <a:srgbClr val="FFFFFF"/>
+                </a:solidFill>
+                <a:latin typeface="Calibri"/>
+                <a:ea typeface="Calibri"/>
+                <a:cs typeface="Calibri"/>
+                <a:sym typeface="Calibri"/>
+              </a:defRPr>
+            </a:lvl1pPr>
+          </a:lstStyle>
           <a:p>
             <a:pPr/>
             <a:r>
-              <a:t>Risk Management</a:t>
+              <a:t>Adoption Can Scale Within 90 Days</a:t>
             </a:r>
           </a:p>
         </p:txBody>
       </p:sp>
       <p:sp>
         <p:nvSpPr>
-          <p:cNvPr id="169" name="Data quality regression risk: dbt tests plus checklist-based validation…"/>
+          <p:cNvPr id="190" name="Planned tenant coverage progression after kickoff"/>
           <p:cNvSpPr txBox="1"/>
-          <p:nvPr>
-            <p:ph type="body" idx="1"/>
-          </p:nvPr>
+          <p:nvPr/>
         </p:nvSpPr>
         <p:spPr>
+          <a:xfrm>
+            <a:off x="889000" y="2054789"/>
+            <a:ext cx="11226800" cy="360822"/>
+          </a:xfrm>
           <a:prstGeom prst="rect">
             <a:avLst/>
           </a:prstGeom>
+          <a:ln w="12700">
+            <a:miter lim="400000"/>
+          </a:ln>
+          <a:extLst>
+            <a:ext uri="{C572A759-6A51-4108-AA02-DFA0A04FC94B}">
+              <ma14:wrappingTextBoxFlag xmlns:ma14="http://schemas.microsoft.com/office/mac/drawingml/2011/main" val="1"/>
+            </a:ext>
+          </a:extLst>
         </p:spPr>
         <p:txBody>
-          <a:bodyPr/>
-          <a:lstStyle/>
+          <a:bodyPr lIns="50800" tIns="50800" rIns="50800" bIns="50800" anchor="ctr">
+            <a:spAutoFit/>
+          </a:bodyPr>
+          <a:lstStyle>
+            <a:lvl1pPr>
+              <a:defRPr sz="1800">
+                <a:latin typeface="Arial"/>
+                <a:ea typeface="Arial"/>
+                <a:cs typeface="Arial"/>
+                <a:sym typeface="Arial"/>
+              </a:defRPr>
+            </a:lvl1pPr>
+          </a:lstStyle>
           <a:p>
             <a:pPr/>
             <a:r>
-              <a:t>Data quality regression risk: dbt tests plus checklist-based validation</a:t>
-            </a:r>
-          </a:p>
-          <a:p>
-            <a:pPr/>
-            <a:r>
-              <a:t>Snapshot staleness risk: freshness alerts and runbook response</a:t>
-            </a:r>
-          </a:p>
-          <a:p>
-            <a:pPr/>
-            <a:r>
-              <a:t>Connector coverage risk: phased roadmap for additional platforms</a:t>
-            </a:r>
-          </a:p>
-          <a:p>
-            <a:pPr/>
-            <a:r>
-              <a:t>Secrets exposure risk: encryption, log scrubbing, and access controls</a:t>
+              <a:t>Planned tenant coverage progression after kickoff</a:t>
             </a:r>
           </a:p>
         </p:txBody>
       </p:sp>
+      <p:graphicFrame>
+        <p:nvGraphicFramePr>
+          <p:cNvPr id="191" name="2D Line Chart"/>
+          <p:cNvGraphicFramePr/>
+          <p:nvPr/>
+        </p:nvGraphicFramePr>
+        <p:xfrm>
+          <a:off x="417488" y="2357323"/>
+          <a:ext cx="11824563" cy="6274854"/>
+        </p:xfrm>
+        <a:graphic xmlns:a="http://schemas.openxmlformats.org/drawingml/2006/main">
+          <a:graphicData uri="http://schemas.openxmlformats.org/drawingml/2006/chart">
+            <c:chart xmlns:c="http://schemas.openxmlformats.org/drawingml/2006/chart" r:id="rId3"/>
+          </a:graphicData>
+        </a:graphic>
+      </p:graphicFrame>
     </p:spTree>
   </p:cSld>
   <p:clrMapOvr>
@@ -4853,78 +5040,161 @@
           <a:chExt cx="0" cy="0"/>
         </a:xfrm>
       </p:grpSpPr>
-      <p:sp>
-        <p:nvSpPr>
-          <p:cNvPr id="171" name="Recommended Demo Flow"/>
-          <p:cNvSpPr txBox="1"/>
-          <p:nvPr>
-            <p:ph type="title"/>
-          </p:nvPr>
-        </p:nvSpPr>
+      <p:pic>
+        <p:nvPicPr>
+          <p:cNvPr id="193" name="header_bar.png" descr="header_bar.png"/>
+          <p:cNvPicPr>
+            <a:picLocks noChangeAspect="1"/>
+          </p:cNvPicPr>
+          <p:nvPr/>
+        </p:nvPicPr>
+        <p:blipFill>
+          <a:blip r:embed="rId2">
+            <a:extLst/>
+          </a:blip>
+          <a:stretch>
+            <a:fillRect/>
+          </a:stretch>
+        </p:blipFill>
         <p:spPr>
+          <a:xfrm>
+            <a:off x="0" y="0"/>
+            <a:ext cx="13004800" cy="1778000"/>
+          </a:xfrm>
           <a:prstGeom prst="rect">
             <a:avLst/>
           </a:prstGeom>
+          <a:ln w="12700">
+            <a:miter lim="400000"/>
+          </a:ln>
+        </p:spPr>
+      </p:pic>
+      <p:sp>
+        <p:nvSpPr>
+          <p:cNvPr id="194" name="Key Risks Have Defined Mitigations"/>
+          <p:cNvSpPr txBox="1"/>
+          <p:nvPr/>
+        </p:nvSpPr>
+        <p:spPr>
+          <a:xfrm>
+            <a:off x="685800" y="595808"/>
+            <a:ext cx="11684000" cy="611784"/>
+          </a:xfrm>
+          <a:prstGeom prst="rect">
+            <a:avLst/>
+          </a:prstGeom>
+          <a:ln w="12700">
+            <a:miter lim="400000"/>
+          </a:ln>
+          <a:extLst>
+            <a:ext uri="{C572A759-6A51-4108-AA02-DFA0A04FC94B}">
+              <ma14:wrappingTextBoxFlag xmlns:ma14="http://schemas.microsoft.com/office/mac/drawingml/2011/main" val="1"/>
+            </a:ext>
+          </a:extLst>
         </p:spPr>
         <p:txBody>
-          <a:bodyPr/>
+          <a:bodyPr lIns="50800" tIns="50800" rIns="50800" bIns="50800" anchor="ctr">
+            <a:spAutoFit/>
+          </a:bodyPr>
           <a:lstStyle>
-            <a:lvl1pPr defTabSz="502412">
-              <a:defRPr sz="6880"/>
+            <a:lvl1pPr>
+              <a:defRPr sz="4000">
+                <a:solidFill>
+                  <a:srgbClr val="FFFFFF"/>
+                </a:solidFill>
+                <a:latin typeface="Calibri"/>
+                <a:ea typeface="Calibri"/>
+                <a:cs typeface="Calibri"/>
+                <a:sym typeface="Calibri"/>
+              </a:defRPr>
             </a:lvl1pPr>
           </a:lstStyle>
           <a:p>
             <a:pPr/>
             <a:r>
-              <a:t>Recommended Demo Flow</a:t>
+              <a:t>Key Risks Have Defined Mitigations</a:t>
             </a:r>
           </a:p>
         </p:txBody>
       </p:sp>
       <p:sp>
         <p:nvSpPr>
-          <p:cNvPr id="172" name="1) Leadership view: KPI and pacing overview…"/>
+          <p:cNvPr id="195" name="- Data quality regression -&gt; enforced dbt tests and quality checklist…"/>
           <p:cNvSpPr txBox="1"/>
-          <p:nvPr>
-            <p:ph type="body" idx="1"/>
-          </p:nvPr>
+          <p:nvPr/>
         </p:nvSpPr>
         <p:spPr>
+          <a:xfrm>
+            <a:off x="889000" y="3256393"/>
+            <a:ext cx="11226801" cy="3164614"/>
+          </a:xfrm>
           <a:prstGeom prst="rect">
             <a:avLst/>
           </a:prstGeom>
+          <a:ln w="12700">
+            <a:miter lim="400000"/>
+          </a:ln>
+          <a:extLst>
+            <a:ext uri="{C572A759-6A51-4108-AA02-DFA0A04FC94B}">
+              <ma14:wrappingTextBoxFlag xmlns:ma14="http://schemas.microsoft.com/office/mac/drawingml/2011/main" val="1"/>
+            </a:ext>
+          </a:extLst>
         </p:spPr>
         <p:txBody>
-          <a:bodyPr/>
+          <a:bodyPr lIns="50800" tIns="50800" rIns="50800" bIns="50800" anchor="ctr">
+            <a:spAutoFit/>
+          </a:bodyPr>
           <a:lstStyle/>
           <a:p>
-            <a:pPr/>
-            <a:r>
-              <a:t>1) Leadership view: KPI and pacing overview</a:t>
-            </a:r>
-          </a:p>
-          <a:p>
-            <a:pPr/>
-            <a:r>
-              <a:t>2) Account lead view: tenant switch and report posture</a:t>
-            </a:r>
-          </a:p>
-          <a:p>
-            <a:pPr/>
-            <a:r>
-              <a:t>3) Analyst view: filters, trends, campaign and creative drill-down</a:t>
-            </a:r>
-          </a:p>
-          <a:p>
-            <a:pPr/>
-            <a:r>
-              <a:t>4) Ops view: freshness indicator and sync telemetry</a:t>
-            </a:r>
-          </a:p>
-          <a:p>
-            <a:pPr/>
-            <a:r>
-              <a:t>5) Security view: tenant and encryption controls</a:t>
+            <a:pPr>
+              <a:defRPr sz="2500">
+                <a:latin typeface="Arial"/>
+                <a:ea typeface="Arial"/>
+                <a:cs typeface="Arial"/>
+                <a:sym typeface="Arial"/>
+              </a:defRPr>
+            </a:pPr>
+            <a:r>
+              <a:t>- Data quality regression -&gt; enforced dbt tests and quality checklist</a:t>
+            </a:r>
+          </a:p>
+          <a:p>
+            <a:pPr>
+              <a:defRPr sz="2500">
+                <a:latin typeface="Arial"/>
+                <a:ea typeface="Arial"/>
+                <a:cs typeface="Arial"/>
+                <a:sym typeface="Arial"/>
+              </a:defRPr>
+            </a:pPr>
+            <a:r>
+              <a:t>- Snapshot staleness -&gt; freshness alerts plus runbook response</a:t>
+            </a:r>
+          </a:p>
+          <a:p>
+            <a:pPr>
+              <a:defRPr sz="2500">
+                <a:latin typeface="Arial"/>
+                <a:ea typeface="Arial"/>
+                <a:cs typeface="Arial"/>
+                <a:sym typeface="Arial"/>
+              </a:defRPr>
+            </a:pPr>
+            <a:r>
+              <a:t>- Connector coverage gaps -&gt; phased roadmap and validation checklist</a:t>
+            </a:r>
+          </a:p>
+          <a:p>
+            <a:pPr>
+              <a:defRPr sz="2500">
+                <a:latin typeface="Arial"/>
+                <a:ea typeface="Arial"/>
+                <a:cs typeface="Arial"/>
+                <a:sym typeface="Arial"/>
+              </a:defRPr>
+            </a:pPr>
+            <a:r>
+              <a:t>- Secrets exposure -&gt; encryption, KMS strategy, and log scrubbing</a:t>
             </a:r>
           </a:p>
         </p:txBody>
@@ -4955,68 +5225,206 @@
           <a:chExt cx="0" cy="0"/>
         </a:xfrm>
       </p:grpSpPr>
-      <p:sp>
-        <p:nvSpPr>
-          <p:cNvPr id="174" name="Decision Asks"/>
-          <p:cNvSpPr txBox="1"/>
-          <p:nvPr>
-            <p:ph type="title"/>
-          </p:nvPr>
-        </p:nvSpPr>
+      <p:pic>
+        <p:nvPicPr>
+          <p:cNvPr id="197" name="header_bar.png" descr="header_bar.png"/>
+          <p:cNvPicPr>
+            <a:picLocks noChangeAspect="1"/>
+          </p:cNvPicPr>
+          <p:nvPr/>
+        </p:nvPicPr>
+        <p:blipFill>
+          <a:blip r:embed="rId2">
+            <a:extLst/>
+          </a:blip>
+          <a:stretch>
+            <a:fillRect/>
+          </a:stretch>
+        </p:blipFill>
         <p:spPr>
+          <a:xfrm>
+            <a:off x="0" y="0"/>
+            <a:ext cx="13004800" cy="1778000"/>
+          </a:xfrm>
           <a:prstGeom prst="rect">
             <a:avLst/>
           </a:prstGeom>
+          <a:ln w="12700">
+            <a:miter lim="400000"/>
+          </a:ln>
+        </p:spPr>
+      </p:pic>
+      <p:sp>
+        <p:nvSpPr>
+          <p:cNvPr id="198" name="Decision Asks and Next Steps"/>
+          <p:cNvSpPr txBox="1"/>
+          <p:nvPr/>
+        </p:nvSpPr>
+        <p:spPr>
+          <a:xfrm>
+            <a:off x="685800" y="595808"/>
+            <a:ext cx="11684000" cy="611784"/>
+          </a:xfrm>
+          <a:prstGeom prst="rect">
+            <a:avLst/>
+          </a:prstGeom>
+          <a:ln w="12700">
+            <a:miter lim="400000"/>
+          </a:ln>
+          <a:extLst>
+            <a:ext uri="{C572A759-6A51-4108-AA02-DFA0A04FC94B}">
+              <ma14:wrappingTextBoxFlag xmlns:ma14="http://schemas.microsoft.com/office/mac/drawingml/2011/main" val="1"/>
+            </a:ext>
+          </a:extLst>
         </p:spPr>
         <p:txBody>
-          <a:bodyPr/>
-          <a:lstStyle/>
+          <a:bodyPr lIns="50800" tIns="50800" rIns="50800" bIns="50800" anchor="ctr">
+            <a:spAutoFit/>
+          </a:bodyPr>
+          <a:lstStyle>
+            <a:lvl1pPr>
+              <a:defRPr sz="4000">
+                <a:solidFill>
+                  <a:srgbClr val="FFFFFF"/>
+                </a:solidFill>
+                <a:latin typeface="Calibri"/>
+                <a:ea typeface="Calibri"/>
+                <a:cs typeface="Calibri"/>
+                <a:sym typeface="Calibri"/>
+              </a:defRPr>
+            </a:lvl1pPr>
+          </a:lstStyle>
           <a:p>
             <a:pPr/>
             <a:r>
-              <a:t>Decision Asks</a:t>
+              <a:t>Decision Asks and Next Steps</a:t>
             </a:r>
           </a:p>
         </p:txBody>
       </p:sp>
       <p:sp>
         <p:nvSpPr>
-          <p:cNvPr id="175" name="Approve pilot tenant list and baseline success metrics…"/>
+          <p:cNvPr id="199" name="- Approve pilot tenant set and success baseline…"/>
           <p:cNvSpPr txBox="1"/>
-          <p:nvPr>
-            <p:ph type="body" idx="1"/>
-          </p:nvPr>
+          <p:nvPr/>
         </p:nvSpPr>
         <p:spPr>
+          <a:xfrm>
+            <a:off x="889000" y="2735485"/>
+            <a:ext cx="11226800" cy="3114230"/>
+          </a:xfrm>
           <a:prstGeom prst="rect">
             <a:avLst/>
           </a:prstGeom>
+          <a:ln w="12700">
+            <a:miter lim="400000"/>
+          </a:ln>
+          <a:extLst>
+            <a:ext uri="{C572A759-6A51-4108-AA02-DFA0A04FC94B}">
+              <ma14:wrappingTextBoxFlag xmlns:ma14="http://schemas.microsoft.com/office/mac/drawingml/2011/main" val="1"/>
+            </a:ext>
+          </a:extLst>
         </p:spPr>
         <p:txBody>
-          <a:bodyPr/>
+          <a:bodyPr lIns="50800" tIns="50800" rIns="50800" bIns="50800" anchor="ctr">
+            <a:spAutoFit/>
+          </a:bodyPr>
           <a:lstStyle/>
           <a:p>
+            <a:pPr>
+              <a:defRPr sz="2400">
+                <a:latin typeface="Arial"/>
+                <a:ea typeface="Arial"/>
+                <a:cs typeface="Arial"/>
+                <a:sym typeface="Arial"/>
+              </a:defRPr>
+            </a:pPr>
+            <a:r>
+              <a:t>- Approve pilot tenant set and success baseline</a:t>
+            </a:r>
+          </a:p>
+          <a:p>
+            <a:pPr>
+              <a:defRPr sz="2400">
+                <a:latin typeface="Arial"/>
+                <a:ea typeface="Arial"/>
+                <a:cs typeface="Arial"/>
+                <a:sym typeface="Arial"/>
+              </a:defRPr>
+            </a:pPr>
+            <a:r>
+              <a:t>- Confirm weekly operating cadence for leadership, account, analyst, and ops</a:t>
+            </a:r>
+          </a:p>
+          <a:p>
+            <a:pPr>
+              <a:defRPr sz="2400">
+                <a:latin typeface="Arial"/>
+                <a:ea typeface="Arial"/>
+                <a:cs typeface="Arial"/>
+                <a:sym typeface="Arial"/>
+              </a:defRPr>
+            </a:pPr>
+            <a:r>
+              <a:t>- Assign escalation owner for reliability incidents and client communications</a:t>
+            </a:r>
+          </a:p>
+          <a:p>
+            <a:pPr>
+              <a:defRPr sz="2400">
+                <a:latin typeface="Arial"/>
+                <a:ea typeface="Arial"/>
+                <a:cs typeface="Arial"/>
+                <a:sym typeface="Arial"/>
+              </a:defRPr>
+            </a:pPr>
+            <a:r>
+              <a:t>- Prioritize next-phase scope: connector expansion + advanced reporting UX</a:t>
+            </a:r>
+          </a:p>
+        </p:txBody>
+      </p:sp>
+      <p:sp>
+        <p:nvSpPr>
+          <p:cNvPr id="200" name="Recommended next action: 45-minute cross-functional walkthrough using this deck and live dashboard demo."/>
+          <p:cNvSpPr txBox="1"/>
+          <p:nvPr/>
+        </p:nvSpPr>
+        <p:spPr>
+          <a:xfrm>
+            <a:off x="889000" y="7205678"/>
+            <a:ext cx="11226800" cy="777845"/>
+          </a:xfrm>
+          <a:prstGeom prst="rect">
+            <a:avLst/>
+          </a:prstGeom>
+          <a:ln w="12700">
+            <a:miter lim="400000"/>
+          </a:ln>
+          <a:extLst>
+            <a:ext uri="{C572A759-6A51-4108-AA02-DFA0A04FC94B}">
+              <ma14:wrappingTextBoxFlag xmlns:ma14="http://schemas.microsoft.com/office/mac/drawingml/2011/main" val="1"/>
+            </a:ext>
+          </a:extLst>
+        </p:spPr>
+        <p:txBody>
+          <a:bodyPr lIns="50800" tIns="50800" rIns="50800" bIns="50800" anchor="ctr">
+            <a:spAutoFit/>
+          </a:bodyPr>
+          <a:lstStyle>
+            <a:lvl1pPr>
+              <a:defRPr sz="2300">
+                <a:latin typeface="Arial"/>
+                <a:ea typeface="Arial"/>
+                <a:cs typeface="Arial"/>
+                <a:sym typeface="Arial"/>
+              </a:defRPr>
+            </a:lvl1pPr>
+          </a:lstStyle>
+          <a:p>
             <a:pPr/>
             <a:r>
-              <a:t>Approve pilot tenant list and baseline success metrics</a:t>
-            </a:r>
-          </a:p>
-          <a:p>
-            <a:pPr/>
-            <a:r>
-              <a:t>Confirm weekly operating cadence across leadership, account, and analyst roles</a:t>
-            </a:r>
-          </a:p>
-          <a:p>
-            <a:pPr/>
-            <a:r>
-              <a:t>Assign owners for reliability escalation and stakeholder communications</a:t>
-            </a:r>
-          </a:p>
-          <a:p>
-            <a:pPr/>
-            <a:r>
-              <a:t>Prioritize next-wave scope: connector expansion and advanced reporting</a:t>
+              <a:t>Recommended next action: 45-minute cross-functional walkthrough using this deck and live dashboard demo.</a:t>
             </a:r>
           </a:p>
         </p:txBody>
@@ -5047,68 +5455,148 @@
           <a:chExt cx="0" cy="0"/>
         </a:xfrm>
       </p:grpSpPr>
-      <p:sp>
-        <p:nvSpPr>
-          <p:cNvPr id="140" name="The Problem We Solve"/>
-          <p:cNvSpPr txBox="1"/>
-          <p:nvPr>
-            <p:ph type="title"/>
-          </p:nvPr>
-        </p:nvSpPr>
+      <p:pic>
+        <p:nvPicPr>
+          <p:cNvPr id="142" name="header_bar.png" descr="header_bar.png"/>
+          <p:cNvPicPr>
+            <a:picLocks noChangeAspect="1"/>
+          </p:cNvPicPr>
+          <p:nvPr/>
+        </p:nvPicPr>
+        <p:blipFill>
+          <a:blip r:embed="rId2">
+            <a:extLst/>
+          </a:blip>
+          <a:stretch>
+            <a:fillRect/>
+          </a:stretch>
+        </p:blipFill>
         <p:spPr>
+          <a:xfrm>
+            <a:off x="0" y="0"/>
+            <a:ext cx="13004800" cy="1778000"/>
+          </a:xfrm>
           <a:prstGeom prst="rect">
             <a:avLst/>
           </a:prstGeom>
+          <a:ln w="12700">
+            <a:miter lim="400000"/>
+          </a:ln>
+        </p:spPr>
+      </p:pic>
+      <p:sp>
+        <p:nvSpPr>
+          <p:cNvPr id="143" name="ADinsights Creates One Trusted Decision Layer"/>
+          <p:cNvSpPr txBox="1"/>
+          <p:nvPr/>
+        </p:nvSpPr>
+        <p:spPr>
+          <a:xfrm>
+            <a:off x="685800" y="595808"/>
+            <a:ext cx="11684000" cy="611784"/>
+          </a:xfrm>
+          <a:prstGeom prst="rect">
+            <a:avLst/>
+          </a:prstGeom>
+          <a:ln w="12700">
+            <a:miter lim="400000"/>
+          </a:ln>
+          <a:extLst>
+            <a:ext uri="{C572A759-6A51-4108-AA02-DFA0A04FC94B}">
+              <ma14:wrappingTextBoxFlag xmlns:ma14="http://schemas.microsoft.com/office/mac/drawingml/2011/main" val="1"/>
+            </a:ext>
+          </a:extLst>
         </p:spPr>
         <p:txBody>
-          <a:bodyPr/>
-          <a:lstStyle/>
+          <a:bodyPr lIns="50800" tIns="50800" rIns="50800" bIns="50800" anchor="ctr">
+            <a:spAutoFit/>
+          </a:bodyPr>
+          <a:lstStyle>
+            <a:lvl1pPr>
+              <a:defRPr sz="4000">
+                <a:solidFill>
+                  <a:srgbClr val="FFFFFF"/>
+                </a:solidFill>
+                <a:latin typeface="Calibri"/>
+                <a:ea typeface="Calibri"/>
+                <a:cs typeface="Calibri"/>
+                <a:sym typeface="Calibri"/>
+              </a:defRPr>
+            </a:lvl1pPr>
+          </a:lstStyle>
           <a:p>
             <a:pPr/>
             <a:r>
-              <a:t>The Problem We Solve</a:t>
+              <a:t>ADinsights Creates One Trusted Decision Layer</a:t>
             </a:r>
           </a:p>
         </p:txBody>
       </p:sp>
       <p:sp>
         <p:nvSpPr>
-          <p:cNvPr id="141" name="Campaign data is fragmented across Meta and Google interfaces…"/>
+          <p:cNvPr id="144" name="- One source of truth across Meta and Google paid media performance…"/>
           <p:cNvSpPr txBox="1"/>
-          <p:nvPr>
-            <p:ph type="body" idx="1"/>
-          </p:nvPr>
+          <p:nvPr/>
         </p:nvSpPr>
         <p:spPr>
+          <a:xfrm>
+            <a:off x="888999" y="4062843"/>
+            <a:ext cx="11226801" cy="2999514"/>
+          </a:xfrm>
           <a:prstGeom prst="rect">
             <a:avLst/>
           </a:prstGeom>
+          <a:ln w="12700">
+            <a:miter lim="400000"/>
+          </a:ln>
+          <a:extLst>
+            <a:ext uri="{C572A759-6A51-4108-AA02-DFA0A04FC94B}">
+              <ma14:wrappingTextBoxFlag xmlns:ma14="http://schemas.microsoft.com/office/mac/drawingml/2011/main" val="1"/>
+            </a:ext>
+          </a:extLst>
         </p:spPr>
         <p:txBody>
-          <a:bodyPr/>
+          <a:bodyPr lIns="50800" tIns="50800" rIns="50800" bIns="50800" anchor="ctr">
+            <a:spAutoFit/>
+          </a:bodyPr>
           <a:lstStyle/>
           <a:p>
-            <a:pPr/>
-            <a:r>
-              <a:t>Campaign data is fragmented across Meta and Google interfaces</a:t>
-            </a:r>
-          </a:p>
-          <a:p>
-            <a:pPr/>
-            <a:r>
-              <a:t>Teams spend hours reconciling exports before every client review</a:t>
-            </a:r>
-          </a:p>
-          <a:p>
-            <a:pPr/>
-            <a:r>
-              <a:t>Leaders get delayed performance visibility</a:t>
-            </a:r>
-          </a:p>
-          <a:p>
-            <a:pPr/>
-            <a:r>
-              <a:t>Ops teams often detect stale data after it impacts reporting</a:t>
+            <a:pPr>
+              <a:defRPr sz="2500">
+                <a:latin typeface="Arial"/>
+                <a:ea typeface="Arial"/>
+                <a:cs typeface="Arial"/>
+                <a:sym typeface="Arial"/>
+              </a:defRPr>
+            </a:pPr>
+            <a:r>
+              <a:t>- One source of truth across Meta and Google paid media performance</a:t>
+            </a:r>
+          </a:p>
+          <a:p>
+            <a:pPr>
+              <a:defRPr sz="2500">
+                <a:latin typeface="Arial"/>
+                <a:ea typeface="Arial"/>
+                <a:cs typeface="Arial"/>
+                <a:sym typeface="Arial"/>
+              </a:defRPr>
+            </a:pPr>
+            <a:r>
+              <a:t>- Faster reporting through automated ingestion, modeling, and dashboard snapshots</a:t>
+            </a:r>
+          </a:p>
+          <a:p>
+            <a:pPr>
+              <a:defRPr sz="2500">
+                <a:latin typeface="Arial"/>
+                <a:ea typeface="Arial"/>
+                <a:cs typeface="Arial"/>
+                <a:sym typeface="Arial"/>
+              </a:defRPr>
+            </a:pPr>
+            <a:r>
+              <a:t>- Higher stakeholder confidence from freshness indicators and runbook-backed operations</a:t>
             </a:r>
           </a:p>
         </p:txBody>
@@ -5139,99 +5627,174 @@
           <a:chExt cx="0" cy="0"/>
         </a:xfrm>
       </p:grpSpPr>
-      <p:sp>
-        <p:nvSpPr>
-          <p:cNvPr id="143" name="Who Needs This"/>
-          <p:cNvSpPr txBox="1"/>
-          <p:nvPr>
-            <p:ph type="title"/>
-          </p:nvPr>
-        </p:nvSpPr>
+      <p:pic>
+        <p:nvPicPr>
+          <p:cNvPr id="146" name="header_bar.png" descr="header_bar.png"/>
+          <p:cNvPicPr>
+            <a:picLocks noChangeAspect="1"/>
+          </p:cNvPicPr>
+          <p:nvPr/>
+        </p:nvPicPr>
+        <p:blipFill>
+          <a:blip r:embed="rId2">
+            <a:extLst/>
+          </a:blip>
+          <a:stretch>
+            <a:fillRect/>
+          </a:stretch>
+        </p:blipFill>
         <p:spPr>
+          <a:xfrm>
+            <a:off x="0" y="0"/>
+            <a:ext cx="13004800" cy="1778000"/>
+          </a:xfrm>
           <a:prstGeom prst="rect">
             <a:avLst/>
           </a:prstGeom>
+          <a:ln w="12700">
+            <a:miter lim="400000"/>
+          </a:ln>
+        </p:spPr>
+      </p:pic>
+      <p:sp>
+        <p:nvSpPr>
+          <p:cNvPr id="147" name="Every Stakeholder Gets Faster Clarity"/>
+          <p:cNvSpPr txBox="1"/>
+          <p:nvPr/>
+        </p:nvSpPr>
+        <p:spPr>
+          <a:xfrm>
+            <a:off x="685800" y="595808"/>
+            <a:ext cx="11684000" cy="611784"/>
+          </a:xfrm>
+          <a:prstGeom prst="rect">
+            <a:avLst/>
+          </a:prstGeom>
+          <a:ln w="12700">
+            <a:miter lim="400000"/>
+          </a:ln>
+          <a:extLst>
+            <a:ext uri="{C572A759-6A51-4108-AA02-DFA0A04FC94B}">
+              <ma14:wrappingTextBoxFlag xmlns:ma14="http://schemas.microsoft.com/office/mac/drawingml/2011/main" val="1"/>
+            </a:ext>
+          </a:extLst>
         </p:spPr>
         <p:txBody>
-          <a:bodyPr/>
-          <a:lstStyle/>
+          <a:bodyPr lIns="50800" tIns="50800" rIns="50800" bIns="50800" anchor="ctr">
+            <a:spAutoFit/>
+          </a:bodyPr>
+          <a:lstStyle>
+            <a:lvl1pPr>
+              <a:defRPr sz="4000">
+                <a:solidFill>
+                  <a:srgbClr val="FFFFFF"/>
+                </a:solidFill>
+                <a:latin typeface="Calibri"/>
+                <a:ea typeface="Calibri"/>
+                <a:cs typeface="Calibri"/>
+                <a:sym typeface="Calibri"/>
+              </a:defRPr>
+            </a:lvl1pPr>
+          </a:lstStyle>
           <a:p>
             <a:pPr/>
             <a:r>
-              <a:t>Who Needs This</a:t>
+              <a:t>Every Stakeholder Gets Faster Clarity</a:t>
             </a:r>
           </a:p>
         </p:txBody>
       </p:sp>
       <p:sp>
         <p:nvSpPr>
-          <p:cNvPr id="144" name="Agency leadership: portfolio visibility and growth confidence…"/>
+          <p:cNvPr id="148" name="- Agency leadership: portfolio visibility and growth confidence…"/>
           <p:cNvSpPr txBox="1"/>
-          <p:nvPr>
-            <p:ph type="body" idx="1"/>
-          </p:nvPr>
+          <p:nvPr/>
         </p:nvSpPr>
         <p:spPr>
+          <a:xfrm>
+            <a:off x="889000" y="3103993"/>
+            <a:ext cx="11226800" cy="4434614"/>
+          </a:xfrm>
           <a:prstGeom prst="rect">
             <a:avLst/>
           </a:prstGeom>
+          <a:ln w="12700">
+            <a:miter lim="400000"/>
+          </a:ln>
+          <a:extLst>
+            <a:ext uri="{C572A759-6A51-4108-AA02-DFA0A04FC94B}">
+              <ma14:wrappingTextBoxFlag xmlns:ma14="http://schemas.microsoft.com/office/mac/drawingml/2011/main" val="1"/>
+            </a:ext>
+          </a:extLst>
         </p:spPr>
         <p:txBody>
-          <a:bodyPr/>
+          <a:bodyPr lIns="50800" tIns="50800" rIns="50800" bIns="50800" anchor="ctr">
+            <a:spAutoFit/>
+          </a:bodyPr>
           <a:lstStyle/>
           <a:p>
-            <a:pPr marL="431165" indent="-431165" defTabSz="566674">
-              <a:spcBef>
-                <a:spcPts val="4000"/>
-              </a:spcBef>
-              <a:defRPr sz="3104"/>
+            <a:pPr>
+              <a:defRPr sz="2500">
+                <a:latin typeface="Arial"/>
+                <a:ea typeface="Arial"/>
+                <a:cs typeface="Arial"/>
+                <a:sym typeface="Arial"/>
+              </a:defRPr>
             </a:pPr>
             <a:r>
-              <a:t>Agency leadership: portfolio visibility and growth confidence</a:t>
-            </a:r>
-          </a:p>
-          <a:p>
-            <a:pPr marL="431165" indent="-431165" defTabSz="566674">
-              <a:spcBef>
-                <a:spcPts val="4000"/>
-              </a:spcBef>
-              <a:defRPr sz="3104"/>
+              <a:t>- Agency leadership: portfolio visibility and growth confidence</a:t>
+            </a:r>
+          </a:p>
+          <a:p>
+            <a:pPr>
+              <a:defRPr sz="2500">
+                <a:latin typeface="Arial"/>
+                <a:ea typeface="Arial"/>
+                <a:cs typeface="Arial"/>
+                <a:sym typeface="Arial"/>
+              </a:defRPr>
             </a:pPr>
             <a:r>
-              <a:t>Account and client success leads: faster weekly and monthly reporting</a:t>
-            </a:r>
-          </a:p>
-          <a:p>
-            <a:pPr marL="431165" indent="-431165" defTabSz="566674">
-              <a:spcBef>
-                <a:spcPts val="4000"/>
-              </a:spcBef>
-              <a:defRPr sz="3104"/>
+              <a:t>- Account and client success: faster client-ready reporting</a:t>
+            </a:r>
+          </a:p>
+          <a:p>
+            <a:pPr>
+              <a:defRPr sz="2500">
+                <a:latin typeface="Arial"/>
+                <a:ea typeface="Arial"/>
+                <a:cs typeface="Arial"/>
+                <a:sym typeface="Arial"/>
+              </a:defRPr>
             </a:pPr>
             <a:r>
-              <a:t>Analysts and media buyers: optimization-ready drill-downs</a:t>
-            </a:r>
-          </a:p>
-          <a:p>
-            <a:pPr marL="431165" indent="-431165" defTabSz="566674">
-              <a:spcBef>
-                <a:spcPts val="4000"/>
-              </a:spcBef>
-              <a:defRPr sz="3104"/>
+              <a:t>- Analysts and media buyers: optimization-ready campaign and creative drill-downs</a:t>
+            </a:r>
+          </a:p>
+          <a:p>
+            <a:pPr>
+              <a:defRPr sz="2500">
+                <a:latin typeface="Arial"/>
+                <a:ea typeface="Arial"/>
+                <a:cs typeface="Arial"/>
+                <a:sym typeface="Arial"/>
+              </a:defRPr>
             </a:pPr>
             <a:r>
-              <a:t>Finance and revenue ops: standardized spend and outcome views</a:t>
-            </a:r>
-          </a:p>
-          <a:p>
-            <a:pPr marL="431165" indent="-431165" defTabSz="566674">
-              <a:spcBef>
-                <a:spcPts val="4000"/>
-              </a:spcBef>
-              <a:defRPr sz="3104"/>
+              <a:t>- Finance and RevOps: standardized spend and outcomes</a:t>
+            </a:r>
+          </a:p>
+          <a:p>
+            <a:pPr>
+              <a:defRPr sz="2500">
+                <a:latin typeface="Arial"/>
+                <a:ea typeface="Arial"/>
+                <a:cs typeface="Arial"/>
+                <a:sym typeface="Arial"/>
+              </a:defRPr>
             </a:pPr>
             <a:r>
-              <a:t>Ops, security, and engineering: reliable, tenant-safe delivery</a:t>
+              <a:t>- Ops and Security: reliable, tenant-safe operations</a:t>
             </a:r>
           </a:p>
         </p:txBody>
@@ -5262,74 +5825,161 @@
           <a:chExt cx="0" cy="0"/>
         </a:xfrm>
       </p:grpSpPr>
-      <p:sp>
-        <p:nvSpPr>
-          <p:cNvPr id="146" name="How ADinsights Works"/>
-          <p:cNvSpPr txBox="1"/>
-          <p:nvPr>
-            <p:ph type="title"/>
-          </p:nvPr>
-        </p:nvSpPr>
+      <p:pic>
+        <p:nvPicPr>
+          <p:cNvPr id="150" name="header_bar.png" descr="header_bar.png"/>
+          <p:cNvPicPr>
+            <a:picLocks noChangeAspect="1"/>
+          </p:cNvPicPr>
+          <p:nvPr/>
+        </p:nvPicPr>
+        <p:blipFill>
+          <a:blip r:embed="rId2">
+            <a:extLst/>
+          </a:blip>
+          <a:stretch>
+            <a:fillRect/>
+          </a:stretch>
+        </p:blipFill>
         <p:spPr>
+          <a:xfrm>
+            <a:off x="0" y="0"/>
+            <a:ext cx="13004800" cy="1778000"/>
+          </a:xfrm>
           <a:prstGeom prst="rect">
             <a:avLst/>
           </a:prstGeom>
+          <a:ln w="12700">
+            <a:miter lim="400000"/>
+          </a:ln>
+        </p:spPr>
+      </p:pic>
+      <p:sp>
+        <p:nvSpPr>
+          <p:cNvPr id="151" name="Current Reporting Friction Slows Decisions"/>
+          <p:cNvSpPr txBox="1"/>
+          <p:nvPr/>
+        </p:nvSpPr>
+        <p:spPr>
+          <a:xfrm>
+            <a:off x="685800" y="595808"/>
+            <a:ext cx="11684000" cy="611784"/>
+          </a:xfrm>
+          <a:prstGeom prst="rect">
+            <a:avLst/>
+          </a:prstGeom>
+          <a:ln w="12700">
+            <a:miter lim="400000"/>
+          </a:ln>
+          <a:extLst>
+            <a:ext uri="{C572A759-6A51-4108-AA02-DFA0A04FC94B}">
+              <ma14:wrappingTextBoxFlag xmlns:ma14="http://schemas.microsoft.com/office/mac/drawingml/2011/main" val="1"/>
+            </a:ext>
+          </a:extLst>
         </p:spPr>
         <p:txBody>
-          <a:bodyPr/>
-          <a:lstStyle/>
+          <a:bodyPr lIns="50800" tIns="50800" rIns="50800" bIns="50800" anchor="ctr">
+            <a:spAutoFit/>
+          </a:bodyPr>
+          <a:lstStyle>
+            <a:lvl1pPr>
+              <a:defRPr sz="4000">
+                <a:solidFill>
+                  <a:srgbClr val="FFFFFF"/>
+                </a:solidFill>
+                <a:latin typeface="Calibri"/>
+                <a:ea typeface="Calibri"/>
+                <a:cs typeface="Calibri"/>
+                <a:sym typeface="Calibri"/>
+              </a:defRPr>
+            </a:lvl1pPr>
+          </a:lstStyle>
           <a:p>
             <a:pPr/>
             <a:r>
-              <a:t>How ADinsights Works</a:t>
+              <a:t>Current Reporting Friction Slows Decisions</a:t>
             </a:r>
           </a:p>
         </p:txBody>
       </p:sp>
       <p:sp>
         <p:nvSpPr>
-          <p:cNvPr id="147" name="Airbyte ingests source platform metrics on schedule…"/>
+          <p:cNvPr id="152" name="- Fragmented channel reporting and manual reconciliation…"/>
           <p:cNvSpPr txBox="1"/>
-          <p:nvPr>
-            <p:ph type="body" idx="1"/>
-          </p:nvPr>
+          <p:nvPr/>
         </p:nvSpPr>
         <p:spPr>
+          <a:xfrm>
+            <a:off x="888999" y="3980293"/>
+            <a:ext cx="11226801" cy="3164614"/>
+          </a:xfrm>
           <a:prstGeom prst="rect">
             <a:avLst/>
           </a:prstGeom>
+          <a:ln w="12700">
+            <a:miter lim="400000"/>
+          </a:ln>
+          <a:extLst>
+            <a:ext uri="{C572A759-6A51-4108-AA02-DFA0A04FC94B}">
+              <ma14:wrappingTextBoxFlag xmlns:ma14="http://schemas.microsoft.com/office/mac/drawingml/2011/main" val="1"/>
+            </a:ext>
+          </a:extLst>
         </p:spPr>
         <p:txBody>
-          <a:bodyPr/>
+          <a:bodyPr lIns="50800" tIns="50800" rIns="50800" bIns="50800" anchor="ctr">
+            <a:spAutoFit/>
+          </a:bodyPr>
           <a:lstStyle/>
           <a:p>
-            <a:pPr/>
-            <a:r>
-              <a:t>Airbyte ingests source platform metrics on schedule</a:t>
-            </a:r>
-          </a:p>
-          <a:p>
-            <a:pPr/>
-            <a:r>
-              <a:t>dbt normalizes staging and mart models with shared metric definitions</a:t>
-            </a:r>
-          </a:p>
-          <a:p>
-            <a:pPr/>
-            <a:r>
-              <a:t>Django API serves tenant-scoped aggregated snapshots</a:t>
-            </a:r>
-          </a:p>
-          <a:p>
-            <a:pPr/>
-            <a:r>
-              <a:t>React dashboards present KPI cards, trends, tables, and geo maps</a:t>
-            </a:r>
-          </a:p>
-          <a:p>
-            <a:pPr/>
-            <a:r>
-              <a:t>Health checks and telemetry expose freshness and sync status</a:t>
+            <a:pPr>
+              <a:defRPr sz="2500">
+                <a:latin typeface="Arial"/>
+                <a:ea typeface="Arial"/>
+                <a:cs typeface="Arial"/>
+                <a:sym typeface="Arial"/>
+              </a:defRPr>
+            </a:pPr>
+            <a:r>
+              <a:t>- Fragmented channel reporting and manual reconciliation</a:t>
+            </a:r>
+          </a:p>
+          <a:p>
+            <a:pPr>
+              <a:defRPr sz="2500">
+                <a:latin typeface="Arial"/>
+                <a:ea typeface="Arial"/>
+                <a:cs typeface="Arial"/>
+                <a:sym typeface="Arial"/>
+              </a:defRPr>
+            </a:pPr>
+            <a:r>
+              <a:t>- Delayed insights for leadership and client reviews</a:t>
+            </a:r>
+          </a:p>
+          <a:p>
+            <a:pPr>
+              <a:defRPr sz="2500">
+                <a:latin typeface="Arial"/>
+                <a:ea typeface="Arial"/>
+                <a:cs typeface="Arial"/>
+                <a:sym typeface="Arial"/>
+              </a:defRPr>
+            </a:pPr>
+            <a:r>
+              <a:t>- Inconsistent definitions across teams</a:t>
+            </a:r>
+          </a:p>
+          <a:p>
+            <a:pPr>
+              <a:defRPr sz="2500">
+                <a:latin typeface="Arial"/>
+                <a:ea typeface="Arial"/>
+                <a:cs typeface="Arial"/>
+                <a:sym typeface="Arial"/>
+              </a:defRPr>
+            </a:pPr>
+            <a:r>
+              <a:t>- Stale data discovered too late in the reporting cycle</a:t>
             </a:r>
           </a:p>
         </p:txBody>
@@ -5360,16 +6010,45 @@
           <a:chExt cx="0" cy="0"/>
         </a:xfrm>
       </p:grpSpPr>
+      <p:pic>
+        <p:nvPicPr>
+          <p:cNvPr id="154" name="header_bar.png" descr="header_bar.png"/>
+          <p:cNvPicPr>
+            <a:picLocks noChangeAspect="1"/>
+          </p:cNvPicPr>
+          <p:nvPr/>
+        </p:nvPicPr>
+        <p:blipFill>
+          <a:blip r:embed="rId2">
+            <a:extLst/>
+          </a:blip>
+          <a:stretch>
+            <a:fillRect/>
+          </a:stretch>
+        </p:blipFill>
+        <p:spPr>
+          <a:xfrm>
+            <a:off x="0" y="0"/>
+            <a:ext cx="13004800" cy="1778000"/>
+          </a:xfrm>
+          <a:prstGeom prst="rect">
+            <a:avLst/>
+          </a:prstGeom>
+          <a:ln w="12700">
+            <a:miter lim="400000"/>
+          </a:ln>
+        </p:spPr>
+      </p:pic>
       <p:sp>
         <p:nvSpPr>
-          <p:cNvPr id="149" name="Capability Maturity Snapshot"/>
+          <p:cNvPr id="155" name="Automated Data Flow Reduces Reporting Risk"/>
           <p:cNvSpPr txBox="1"/>
           <p:nvPr/>
         </p:nvSpPr>
         <p:spPr>
           <a:xfrm>
-            <a:off x="762000" y="475589"/>
-            <a:ext cx="11430000" cy="572822"/>
+            <a:off x="685800" y="595808"/>
+            <a:ext cx="11684000" cy="611784"/>
           </a:xfrm>
           <a:prstGeom prst="rect">
             <a:avLst/>
@@ -5387,25 +6066,37 @@
           <a:bodyPr lIns="50800" tIns="50800" rIns="50800" bIns="50800" anchor="ctr">
             <a:spAutoFit/>
           </a:bodyPr>
-          <a:lstStyle/>
+          <a:lstStyle>
+            <a:lvl1pPr>
+              <a:defRPr sz="4000">
+                <a:solidFill>
+                  <a:srgbClr val="FFFFFF"/>
+                </a:solidFill>
+                <a:latin typeface="Calibri"/>
+                <a:ea typeface="Calibri"/>
+                <a:cs typeface="Calibri"/>
+                <a:sym typeface="Calibri"/>
+              </a:defRPr>
+            </a:lvl1pPr>
+          </a:lstStyle>
           <a:p>
             <a:pPr/>
             <a:r>
-              <a:t>Capability Maturity Snapshot</a:t>
+              <a:t>Automated Data Flow Reduces Reporting Risk</a:t>
             </a:r>
           </a:p>
         </p:txBody>
       </p:sp>
       <p:sp>
         <p:nvSpPr>
-          <p:cNvPr id="150" name="Current capability areas in ADinsights"/>
+          <p:cNvPr id="156" name="End-to-end flow from ingestion to stakeholder decisions"/>
           <p:cNvSpPr txBox="1"/>
           <p:nvPr/>
         </p:nvSpPr>
         <p:spPr>
           <a:xfrm>
-            <a:off x="762000" y="1116939"/>
-            <a:ext cx="11430000" cy="572822"/>
+            <a:off x="889000" y="2054789"/>
+            <a:ext cx="11226801" cy="360822"/>
           </a:xfrm>
           <a:prstGeom prst="rect">
             <a:avLst/>
@@ -5423,31 +6114,456 @@
           <a:bodyPr lIns="50800" tIns="50800" rIns="50800" bIns="50800" anchor="ctr">
             <a:spAutoFit/>
           </a:bodyPr>
-          <a:lstStyle/>
+          <a:lstStyle>
+            <a:lvl1pPr>
+              <a:defRPr sz="1800">
+                <a:latin typeface="Arial"/>
+                <a:ea typeface="Arial"/>
+                <a:cs typeface="Arial"/>
+                <a:sym typeface="Arial"/>
+              </a:defRPr>
+            </a:lvl1pPr>
+          </a:lstStyle>
           <a:p>
             <a:pPr/>
             <a:r>
-              <a:t>Current capability areas in ADinsights</a:t>
+              <a:t>End-to-end flow from ingestion to stakeholder decisions</a:t>
             </a:r>
           </a:p>
         </p:txBody>
       </p:sp>
-      <p:graphicFrame>
-        <p:nvGraphicFramePr>
-          <p:cNvPr id="151" name="2D Pie Chart"/>
-          <p:cNvGraphicFramePr/>
+      <p:sp>
+        <p:nvSpPr>
+          <p:cNvPr id="157" name="Airbyte…"/>
+          <p:cNvSpPr/>
           <p:nvPr/>
-        </p:nvGraphicFramePr>
-        <p:xfrm>
-          <a:off x="1143000" y="1905000"/>
-          <a:ext cx="5461000" cy="5461000"/>
-        </p:xfrm>
-        <a:graphic xmlns:a="http://schemas.openxmlformats.org/drawingml/2006/main">
-          <a:graphicData uri="http://schemas.openxmlformats.org/drawingml/2006/chart">
-            <c:chart xmlns:c="http://schemas.openxmlformats.org/drawingml/2006/chart" r:id="rId2"/>
-          </a:graphicData>
-        </a:graphic>
-      </p:graphicFrame>
+        </p:nvSpPr>
+        <p:spPr>
+          <a:xfrm>
+            <a:off x="762000" y="3556000"/>
+            <a:ext cx="2413000" cy="1143000"/>
+          </a:xfrm>
+          <a:prstGeom prst="rect">
+            <a:avLst/>
+          </a:prstGeom>
+          <a:solidFill>
+            <a:schemeClr val="accent1"/>
+          </a:solidFill>
+          <a:ln w="12700">
+            <a:miter lim="400000"/>
+          </a:ln>
+          <a:extLst>
+            <a:ext uri="{C572A759-6A51-4108-AA02-DFA0A04FC94B}">
+              <ma14:wrappingTextBoxFlag xmlns:ma14="http://schemas.microsoft.com/office/mac/drawingml/2011/main" val="1"/>
+            </a:ext>
+          </a:extLst>
+        </p:spPr>
+        <p:txBody>
+          <a:bodyPr lIns="50800" tIns="50800" rIns="50800" bIns="50800" anchor="ctr"/>
+          <a:lstStyle/>
+          <a:p>
+            <a:pPr algn="ctr">
+              <a:spcBef>
+                <a:spcPts val="0"/>
+              </a:spcBef>
+              <a:defRPr sz="1600">
+                <a:latin typeface="Arial"/>
+                <a:ea typeface="Arial"/>
+                <a:cs typeface="Arial"/>
+                <a:sym typeface="Arial"/>
+              </a:defRPr>
+            </a:pPr>
+            <a:r>
+              <a:t>Airbyte</a:t>
+            </a:r>
+          </a:p>
+          <a:p>
+            <a:pPr algn="ctr">
+              <a:spcBef>
+                <a:spcPts val="0"/>
+              </a:spcBef>
+              <a:defRPr sz="1600">
+                <a:latin typeface="Arial"/>
+                <a:ea typeface="Arial"/>
+                <a:cs typeface="Arial"/>
+                <a:sym typeface="Arial"/>
+              </a:defRPr>
+            </a:pPr>
+            <a:r>
+              <a:t>Ingestion</a:t>
+            </a:r>
+          </a:p>
+        </p:txBody>
+      </p:sp>
+      <p:sp>
+        <p:nvSpPr>
+          <p:cNvPr id="158" name="dbt…"/>
+          <p:cNvSpPr/>
+          <p:nvPr/>
+        </p:nvSpPr>
+        <p:spPr>
+          <a:xfrm>
+            <a:off x="3683000" y="3556000"/>
+            <a:ext cx="2413000" cy="1143000"/>
+          </a:xfrm>
+          <a:prstGeom prst="rect">
+            <a:avLst/>
+          </a:prstGeom>
+          <a:solidFill>
+            <a:schemeClr val="accent1"/>
+          </a:solidFill>
+          <a:ln w="12700">
+            <a:miter lim="400000"/>
+          </a:ln>
+          <a:extLst>
+            <a:ext uri="{C572A759-6A51-4108-AA02-DFA0A04FC94B}">
+              <ma14:wrappingTextBoxFlag xmlns:ma14="http://schemas.microsoft.com/office/mac/drawingml/2011/main" val="1"/>
+            </a:ext>
+          </a:extLst>
+        </p:spPr>
+        <p:txBody>
+          <a:bodyPr lIns="50800" tIns="50800" rIns="50800" bIns="50800" anchor="ctr"/>
+          <a:lstStyle/>
+          <a:p>
+            <a:pPr algn="ctr">
+              <a:spcBef>
+                <a:spcPts val="0"/>
+              </a:spcBef>
+              <a:defRPr sz="1600">
+                <a:latin typeface="Arial"/>
+                <a:ea typeface="Arial"/>
+                <a:cs typeface="Arial"/>
+                <a:sym typeface="Arial"/>
+              </a:defRPr>
+            </a:pPr>
+            <a:r>
+              <a:t>dbt</a:t>
+            </a:r>
+          </a:p>
+          <a:p>
+            <a:pPr algn="ctr">
+              <a:spcBef>
+                <a:spcPts val="0"/>
+              </a:spcBef>
+              <a:defRPr sz="1600">
+                <a:latin typeface="Arial"/>
+                <a:ea typeface="Arial"/>
+                <a:cs typeface="Arial"/>
+                <a:sym typeface="Arial"/>
+              </a:defRPr>
+            </a:pPr>
+            <a:r>
+              <a:t>Modeling</a:t>
+            </a:r>
+          </a:p>
+        </p:txBody>
+      </p:sp>
+      <p:sp>
+        <p:nvSpPr>
+          <p:cNvPr id="159" name="Django API…"/>
+          <p:cNvSpPr/>
+          <p:nvPr/>
+        </p:nvSpPr>
+        <p:spPr>
+          <a:xfrm>
+            <a:off x="6604000" y="3556000"/>
+            <a:ext cx="2413000" cy="1143000"/>
+          </a:xfrm>
+          <a:prstGeom prst="rect">
+            <a:avLst/>
+          </a:prstGeom>
+          <a:solidFill>
+            <a:schemeClr val="accent1"/>
+          </a:solidFill>
+          <a:ln w="12700">
+            <a:miter lim="400000"/>
+          </a:ln>
+          <a:extLst>
+            <a:ext uri="{C572A759-6A51-4108-AA02-DFA0A04FC94B}">
+              <ma14:wrappingTextBoxFlag xmlns:ma14="http://schemas.microsoft.com/office/mac/drawingml/2011/main" val="1"/>
+            </a:ext>
+          </a:extLst>
+        </p:spPr>
+        <p:txBody>
+          <a:bodyPr lIns="50800" tIns="50800" rIns="50800" bIns="50800" anchor="ctr"/>
+          <a:lstStyle/>
+          <a:p>
+            <a:pPr algn="ctr">
+              <a:spcBef>
+                <a:spcPts val="0"/>
+              </a:spcBef>
+              <a:defRPr sz="1600">
+                <a:latin typeface="Arial"/>
+                <a:ea typeface="Arial"/>
+                <a:cs typeface="Arial"/>
+                <a:sym typeface="Arial"/>
+              </a:defRPr>
+            </a:pPr>
+            <a:r>
+              <a:t>Django API</a:t>
+            </a:r>
+          </a:p>
+          <a:p>
+            <a:pPr algn="ctr">
+              <a:spcBef>
+                <a:spcPts val="0"/>
+              </a:spcBef>
+              <a:defRPr sz="1600">
+                <a:latin typeface="Arial"/>
+                <a:ea typeface="Arial"/>
+                <a:cs typeface="Arial"/>
+                <a:sym typeface="Arial"/>
+              </a:defRPr>
+            </a:pPr>
+            <a:r>
+              <a:t>Snapshots</a:t>
+            </a:r>
+          </a:p>
+        </p:txBody>
+      </p:sp>
+      <p:sp>
+        <p:nvSpPr>
+          <p:cNvPr id="160" name="React UI…"/>
+          <p:cNvSpPr/>
+          <p:nvPr/>
+        </p:nvSpPr>
+        <p:spPr>
+          <a:xfrm>
+            <a:off x="9525000" y="3556000"/>
+            <a:ext cx="2413000" cy="1143000"/>
+          </a:xfrm>
+          <a:prstGeom prst="rect">
+            <a:avLst/>
+          </a:prstGeom>
+          <a:solidFill>
+            <a:schemeClr val="accent1"/>
+          </a:solidFill>
+          <a:ln w="12700">
+            <a:miter lim="400000"/>
+          </a:ln>
+          <a:extLst>
+            <a:ext uri="{C572A759-6A51-4108-AA02-DFA0A04FC94B}">
+              <ma14:wrappingTextBoxFlag xmlns:ma14="http://schemas.microsoft.com/office/mac/drawingml/2011/main" val="1"/>
+            </a:ext>
+          </a:extLst>
+        </p:spPr>
+        <p:txBody>
+          <a:bodyPr lIns="50800" tIns="50800" rIns="50800" bIns="50800" anchor="ctr"/>
+          <a:lstStyle/>
+          <a:p>
+            <a:pPr algn="ctr">
+              <a:spcBef>
+                <a:spcPts val="0"/>
+              </a:spcBef>
+              <a:defRPr sz="1600">
+                <a:latin typeface="Arial"/>
+                <a:ea typeface="Arial"/>
+                <a:cs typeface="Arial"/>
+                <a:sym typeface="Arial"/>
+              </a:defRPr>
+            </a:pPr>
+            <a:r>
+              <a:t>React UI</a:t>
+            </a:r>
+          </a:p>
+          <a:p>
+            <a:pPr algn="ctr">
+              <a:spcBef>
+                <a:spcPts val="0"/>
+              </a:spcBef>
+              <a:defRPr sz="1600">
+                <a:latin typeface="Arial"/>
+                <a:ea typeface="Arial"/>
+                <a:cs typeface="Arial"/>
+                <a:sym typeface="Arial"/>
+              </a:defRPr>
+            </a:pPr>
+            <a:r>
+              <a:t>Dashboards</a:t>
+            </a:r>
+          </a:p>
+        </p:txBody>
+      </p:sp>
+      <p:sp>
+        <p:nvSpPr>
+          <p:cNvPr id="161" name="-&gt;"/>
+          <p:cNvSpPr txBox="1"/>
+          <p:nvPr/>
+        </p:nvSpPr>
+        <p:spPr>
+          <a:xfrm>
+            <a:off x="3238499" y="3347163"/>
+            <a:ext cx="381001" cy="1078074"/>
+          </a:xfrm>
+          <a:prstGeom prst="rect">
+            <a:avLst/>
+          </a:prstGeom>
+          <a:ln w="12700">
+            <a:miter lim="400000"/>
+          </a:ln>
+          <a:extLst>
+            <a:ext uri="{C572A759-6A51-4108-AA02-DFA0A04FC94B}">
+              <ma14:wrappingTextBoxFlag xmlns:ma14="http://schemas.microsoft.com/office/mac/drawingml/2011/main" val="1"/>
+            </a:ext>
+          </a:extLst>
+        </p:spPr>
+        <p:txBody>
+          <a:bodyPr lIns="50800" tIns="50800" rIns="50800" bIns="50800" anchor="ctr">
+            <a:spAutoFit/>
+          </a:bodyPr>
+          <a:lstStyle>
+            <a:lvl1pPr>
+              <a:defRPr sz="3400">
+                <a:latin typeface="Arial"/>
+                <a:ea typeface="Arial"/>
+                <a:cs typeface="Arial"/>
+                <a:sym typeface="Arial"/>
+              </a:defRPr>
+            </a:lvl1pPr>
+          </a:lstStyle>
+          <a:p>
+            <a:pPr/>
+            <a:r>
+              <a:t>-&gt;</a:t>
+            </a:r>
+          </a:p>
+        </p:txBody>
+      </p:sp>
+      <p:sp>
+        <p:nvSpPr>
+          <p:cNvPr id="162" name="-&gt;"/>
+          <p:cNvSpPr txBox="1"/>
+          <p:nvPr/>
+        </p:nvSpPr>
+        <p:spPr>
+          <a:xfrm>
+            <a:off x="6159499" y="3347163"/>
+            <a:ext cx="381001" cy="1078074"/>
+          </a:xfrm>
+          <a:prstGeom prst="rect">
+            <a:avLst/>
+          </a:prstGeom>
+          <a:ln w="12700">
+            <a:miter lim="400000"/>
+          </a:ln>
+          <a:extLst>
+            <a:ext uri="{C572A759-6A51-4108-AA02-DFA0A04FC94B}">
+              <ma14:wrappingTextBoxFlag xmlns:ma14="http://schemas.microsoft.com/office/mac/drawingml/2011/main" val="1"/>
+            </a:ext>
+          </a:extLst>
+        </p:spPr>
+        <p:txBody>
+          <a:bodyPr lIns="50800" tIns="50800" rIns="50800" bIns="50800" anchor="ctr">
+            <a:spAutoFit/>
+          </a:bodyPr>
+          <a:lstStyle>
+            <a:lvl1pPr>
+              <a:defRPr sz="3400">
+                <a:latin typeface="Arial"/>
+                <a:ea typeface="Arial"/>
+                <a:cs typeface="Arial"/>
+                <a:sym typeface="Arial"/>
+              </a:defRPr>
+            </a:lvl1pPr>
+          </a:lstStyle>
+          <a:p>
+            <a:pPr/>
+            <a:r>
+              <a:t>-&gt;</a:t>
+            </a:r>
+          </a:p>
+        </p:txBody>
+      </p:sp>
+      <p:sp>
+        <p:nvSpPr>
+          <p:cNvPr id="163" name="-&gt;"/>
+          <p:cNvSpPr txBox="1"/>
+          <p:nvPr/>
+        </p:nvSpPr>
+        <p:spPr>
+          <a:xfrm>
+            <a:off x="9080499" y="3347163"/>
+            <a:ext cx="381001" cy="1078074"/>
+          </a:xfrm>
+          <a:prstGeom prst="rect">
+            <a:avLst/>
+          </a:prstGeom>
+          <a:ln w="12700">
+            <a:miter lim="400000"/>
+          </a:ln>
+          <a:extLst>
+            <a:ext uri="{C572A759-6A51-4108-AA02-DFA0A04FC94B}">
+              <ma14:wrappingTextBoxFlag xmlns:ma14="http://schemas.microsoft.com/office/mac/drawingml/2011/main" val="1"/>
+            </a:ext>
+          </a:extLst>
+        </p:spPr>
+        <p:txBody>
+          <a:bodyPr lIns="50800" tIns="50800" rIns="50800" bIns="50800" anchor="ctr">
+            <a:spAutoFit/>
+          </a:bodyPr>
+          <a:lstStyle>
+            <a:lvl1pPr>
+              <a:defRPr sz="3400">
+                <a:latin typeface="Arial"/>
+                <a:ea typeface="Arial"/>
+                <a:cs typeface="Arial"/>
+                <a:sym typeface="Arial"/>
+              </a:defRPr>
+            </a:lvl1pPr>
+          </a:lstStyle>
+          <a:p>
+            <a:pPr/>
+            <a:r>
+              <a:t>-&gt;</a:t>
+            </a:r>
+          </a:p>
+        </p:txBody>
+      </p:sp>
+      <p:sp>
+        <p:nvSpPr>
+          <p:cNvPr id="164" name="Tenant-safe context across every layer | Aggregated metrics only | Freshness monitored"/>
+          <p:cNvSpPr txBox="1"/>
+          <p:nvPr/>
+        </p:nvSpPr>
+        <p:spPr>
+          <a:xfrm>
+            <a:off x="888999" y="5776304"/>
+            <a:ext cx="11226801" cy="385392"/>
+          </a:xfrm>
+          <a:prstGeom prst="rect">
+            <a:avLst/>
+          </a:prstGeom>
+          <a:ln w="12700">
+            <a:miter lim="400000"/>
+          </a:ln>
+          <a:extLst>
+            <a:ext uri="{C572A759-6A51-4108-AA02-DFA0A04FC94B}">
+              <ma14:wrappingTextBoxFlag xmlns:ma14="http://schemas.microsoft.com/office/mac/drawingml/2011/main" val="1"/>
+            </a:ext>
+          </a:extLst>
+        </p:spPr>
+        <p:txBody>
+          <a:bodyPr lIns="50800" tIns="50800" rIns="50800" bIns="50800" anchor="ctr">
+            <a:spAutoFit/>
+          </a:bodyPr>
+          <a:lstStyle>
+            <a:lvl1pPr>
+              <a:defRPr sz="2000">
+                <a:latin typeface="Arial"/>
+                <a:ea typeface="Arial"/>
+                <a:cs typeface="Arial"/>
+                <a:sym typeface="Arial"/>
+              </a:defRPr>
+            </a:lvl1pPr>
+          </a:lstStyle>
+          <a:p>
+            <a:pPr/>
+            <a:r>
+              <a:t>Tenant-safe context across every layer | Aggregated metrics only | Freshness monitored</a:t>
+            </a:r>
+          </a:p>
+        </p:txBody>
+      </p:sp>
     </p:spTree>
   </p:cSld>
   <p:clrMapOvr>
@@ -5474,16 +6590,183 @@
           <a:chExt cx="0" cy="0"/>
         </a:xfrm>
       </p:grpSpPr>
+      <p:pic>
+        <p:nvPicPr>
+          <p:cNvPr id="166" name="header_bar.png" descr="header_bar.png"/>
+          <p:cNvPicPr>
+            <a:picLocks noChangeAspect="1"/>
+          </p:cNvPicPr>
+          <p:nvPr/>
+        </p:nvPicPr>
+        <p:blipFill>
+          <a:blip r:embed="rId2">
+            <a:extLst/>
+          </a:blip>
+          <a:stretch>
+            <a:fillRect/>
+          </a:stretch>
+        </p:blipFill>
+        <p:spPr>
+          <a:xfrm>
+            <a:off x="0" y="0"/>
+            <a:ext cx="13004800" cy="1778000"/>
+          </a:xfrm>
+          <a:prstGeom prst="rect">
+            <a:avLst/>
+          </a:prstGeom>
+          <a:ln w="12700">
+            <a:miter lim="400000"/>
+          </a:ln>
+        </p:spPr>
+      </p:pic>
       <p:sp>
         <p:nvSpPr>
-          <p:cNvPr id="153" name="Operational Reliability Targets"/>
+          <p:cNvPr id="167" name="Role-Based Value Is Clear and Actionable"/>
           <p:cNvSpPr txBox="1"/>
           <p:nvPr/>
         </p:nvSpPr>
         <p:spPr>
           <a:xfrm>
-            <a:off x="762000" y="475589"/>
-            <a:ext cx="11430000" cy="572822"/>
+            <a:off x="685800" y="595808"/>
+            <a:ext cx="11684001" cy="611784"/>
+          </a:xfrm>
+          <a:prstGeom prst="rect">
+            <a:avLst/>
+          </a:prstGeom>
+          <a:ln w="12700">
+            <a:miter lim="400000"/>
+          </a:ln>
+          <a:extLst>
+            <a:ext uri="{C572A759-6A51-4108-AA02-DFA0A04FC94B}">
+              <ma14:wrappingTextBoxFlag xmlns:ma14="http://schemas.microsoft.com/office/mac/drawingml/2011/main" val="1"/>
+            </a:ext>
+          </a:extLst>
+        </p:spPr>
+        <p:txBody>
+          <a:bodyPr lIns="50800" tIns="50800" rIns="50800" bIns="50800" anchor="ctr">
+            <a:spAutoFit/>
+          </a:bodyPr>
+          <a:lstStyle>
+            <a:lvl1pPr>
+              <a:defRPr sz="4000">
+                <a:solidFill>
+                  <a:srgbClr val="FFFFFF"/>
+                </a:solidFill>
+                <a:latin typeface="Calibri"/>
+                <a:ea typeface="Calibri"/>
+                <a:cs typeface="Calibri"/>
+                <a:sym typeface="Calibri"/>
+              </a:defRPr>
+            </a:lvl1pPr>
+          </a:lstStyle>
+          <a:p>
+            <a:pPr/>
+            <a:r>
+              <a:t>Role-Based Value Is Clear and Actionable</a:t>
+            </a:r>
+          </a:p>
+        </p:txBody>
+      </p:sp>
+      <p:sp>
+        <p:nvSpPr>
+          <p:cNvPr id="168" name="Commercial Stakeholders"/>
+          <p:cNvSpPr txBox="1"/>
+          <p:nvPr/>
+        </p:nvSpPr>
+        <p:spPr>
+          <a:xfrm>
+            <a:off x="889000" y="2240185"/>
+            <a:ext cx="5334000" cy="447230"/>
+          </a:xfrm>
+          <a:prstGeom prst="rect">
+            <a:avLst/>
+          </a:prstGeom>
+          <a:ln w="12700">
+            <a:miter lim="400000"/>
+          </a:ln>
+          <a:extLst>
+            <a:ext uri="{C572A759-6A51-4108-AA02-DFA0A04FC94B}">
+              <ma14:wrappingTextBoxFlag xmlns:ma14="http://schemas.microsoft.com/office/mac/drawingml/2011/main" val="1"/>
+            </a:ext>
+          </a:extLst>
+        </p:spPr>
+        <p:txBody>
+          <a:bodyPr lIns="50800" tIns="50800" rIns="50800" bIns="50800" anchor="ctr">
+            <a:spAutoFit/>
+          </a:bodyPr>
+          <a:lstStyle>
+            <a:lvl1pPr>
+              <a:defRPr sz="2400">
+                <a:latin typeface="Arial"/>
+                <a:ea typeface="Arial"/>
+                <a:cs typeface="Arial"/>
+                <a:sym typeface="Arial"/>
+              </a:defRPr>
+            </a:lvl1pPr>
+          </a:lstStyle>
+          <a:p>
+            <a:pPr/>
+            <a:r>
+              <a:t>Commercial Stakeholders</a:t>
+            </a:r>
+          </a:p>
+        </p:txBody>
+      </p:sp>
+      <p:sp>
+        <p:nvSpPr>
+          <p:cNvPr id="169" name="Delivery Stakeholders"/>
+          <p:cNvSpPr txBox="1"/>
+          <p:nvPr/>
+        </p:nvSpPr>
+        <p:spPr>
+          <a:xfrm>
+            <a:off x="6807200" y="2240185"/>
+            <a:ext cx="5334001" cy="447230"/>
+          </a:xfrm>
+          <a:prstGeom prst="rect">
+            <a:avLst/>
+          </a:prstGeom>
+          <a:ln w="12700">
+            <a:miter lim="400000"/>
+          </a:ln>
+          <a:extLst>
+            <a:ext uri="{C572A759-6A51-4108-AA02-DFA0A04FC94B}">
+              <ma14:wrappingTextBoxFlag xmlns:ma14="http://schemas.microsoft.com/office/mac/drawingml/2011/main" val="1"/>
+            </a:ext>
+          </a:extLst>
+        </p:spPr>
+        <p:txBody>
+          <a:bodyPr lIns="50800" tIns="50800" rIns="50800" bIns="50800" anchor="ctr">
+            <a:spAutoFit/>
+          </a:bodyPr>
+          <a:lstStyle>
+            <a:lvl1pPr>
+              <a:defRPr sz="2400">
+                <a:latin typeface="Arial"/>
+                <a:ea typeface="Arial"/>
+                <a:cs typeface="Arial"/>
+                <a:sym typeface="Arial"/>
+              </a:defRPr>
+            </a:lvl1pPr>
+          </a:lstStyle>
+          <a:p>
+            <a:pPr/>
+            <a:r>
+              <a:t>Delivery Stakeholders</a:t>
+            </a:r>
+          </a:p>
+        </p:txBody>
+      </p:sp>
+      <p:sp>
+        <p:nvSpPr>
+          <p:cNvPr id="170" name="- Leadership: see portfolio health at a glance…"/>
+          <p:cNvSpPr txBox="1"/>
+          <p:nvPr/>
+        </p:nvSpPr>
+        <p:spPr>
+          <a:xfrm>
+            <a:off x="889000" y="3960204"/>
+            <a:ext cx="5334001" cy="2036392"/>
           </a:xfrm>
           <a:prstGeom prst="rect">
             <a:avLst/>
@@ -5503,23 +6786,56 @@
           </a:bodyPr>
           <a:lstStyle/>
           <a:p>
-            <a:pPr/>
-            <a:r>
-              <a:t>Operational Reliability Targets</a:t>
+            <a:pPr>
+              <a:defRPr sz="2000">
+                <a:latin typeface="Arial"/>
+                <a:ea typeface="Arial"/>
+                <a:cs typeface="Arial"/>
+                <a:sym typeface="Arial"/>
+              </a:defRPr>
+            </a:pPr>
+            <a:r>
+              <a:t>- Leadership: see portfolio health at a glance</a:t>
+            </a:r>
+          </a:p>
+          <a:p>
+            <a:pPr>
+              <a:defRPr sz="2000">
+                <a:latin typeface="Arial"/>
+                <a:ea typeface="Arial"/>
+                <a:cs typeface="Arial"/>
+                <a:sym typeface="Arial"/>
+              </a:defRPr>
+            </a:pPr>
+            <a:r>
+              <a:t>- Account leads: prep client reviews faster</a:t>
+            </a:r>
+          </a:p>
+          <a:p>
+            <a:pPr>
+              <a:defRPr sz="2000">
+                <a:latin typeface="Arial"/>
+                <a:ea typeface="Arial"/>
+                <a:cs typeface="Arial"/>
+                <a:sym typeface="Arial"/>
+              </a:defRPr>
+            </a:pPr>
+            <a:r>
+              <a:t>- Finance: track spend efficiency and pacing</a:t>
             </a:r>
           </a:p>
         </p:txBody>
       </p:sp>
       <p:sp>
         <p:nvSpPr>
-          <p:cNvPr id="154" name="SLA and freshness targets aligned to stakeholder reporting needs"/>
+          <p:cNvPr id="171" name="- Analysts: drill into campaigns and creative performance…"/>
           <p:cNvSpPr txBox="1"/>
           <p:nvPr/>
         </p:nvSpPr>
         <p:spPr>
           <a:xfrm>
-            <a:off x="762000" y="634339"/>
-            <a:ext cx="11430000" cy="1055422"/>
+            <a:off x="6807199" y="3185504"/>
+            <a:ext cx="5334001" cy="2620592"/>
           </a:xfrm>
           <a:prstGeom prst="rect">
             <a:avLst/>
@@ -5539,29 +6855,46 @@
           </a:bodyPr>
           <a:lstStyle/>
           <a:p>
-            <a:pPr/>
-            <a:r>
-              <a:t>SLA and freshness targets aligned to stakeholder reporting needs</a:t>
+            <a:pPr>
+              <a:defRPr sz="2000">
+                <a:latin typeface="Arial"/>
+                <a:ea typeface="Arial"/>
+                <a:cs typeface="Arial"/>
+                <a:sym typeface="Arial"/>
+              </a:defRPr>
+            </a:pPr>
+            <a:r>
+              <a:t>- Analysts: drill into campaigns and creative performance</a:t>
+            </a:r>
+          </a:p>
+          <a:p>
+            <a:pPr>
+              <a:defRPr sz="2000">
+                <a:latin typeface="Arial"/>
+                <a:ea typeface="Arial"/>
+                <a:cs typeface="Arial"/>
+                <a:sym typeface="Arial"/>
+              </a:defRPr>
+            </a:pPr>
+            <a:r>
+              <a:t>- Ops: monitor freshness and sync reliability</a:t>
+            </a:r>
+          </a:p>
+          <a:p>
+            <a:pPr>
+              <a:defRPr sz="2000">
+                <a:latin typeface="Arial"/>
+                <a:ea typeface="Arial"/>
+                <a:cs typeface="Arial"/>
+                <a:sym typeface="Arial"/>
+              </a:defRPr>
+            </a:pPr>
+            <a:r>
+              <a:t>- Security: maintain tenant isolation and secrets hygiene</a:t>
             </a:r>
           </a:p>
         </p:txBody>
       </p:sp>
-      <p:graphicFrame>
-        <p:nvGraphicFramePr>
-          <p:cNvPr id="155" name="2D Column Chart"/>
-          <p:cNvGraphicFramePr/>
-          <p:nvPr/>
-        </p:nvGraphicFramePr>
-        <p:xfrm>
-          <a:off x="353988" y="1569923"/>
-          <a:ext cx="11457013" cy="6274854"/>
-        </p:xfrm>
-        <a:graphic xmlns:a="http://schemas.openxmlformats.org/drawingml/2006/main">
-          <a:graphicData uri="http://schemas.openxmlformats.org/drawingml/2006/chart">
-            <c:chart xmlns:c="http://schemas.openxmlformats.org/drawingml/2006/chart" r:id="rId2"/>
-          </a:graphicData>
-        </a:graphic>
-      </p:graphicFrame>
     </p:spTree>
   </p:cSld>
   <p:clrMapOvr>
@@ -5588,16 +6921,45 @@
           <a:chExt cx="0" cy="0"/>
         </a:xfrm>
       </p:grpSpPr>
+      <p:pic>
+        <p:nvPicPr>
+          <p:cNvPr id="173" name="header_bar.png" descr="header_bar.png"/>
+          <p:cNvPicPr>
+            <a:picLocks noChangeAspect="1"/>
+          </p:cNvPicPr>
+          <p:nvPr/>
+        </p:nvPicPr>
+        <p:blipFill>
+          <a:blip r:embed="rId2">
+            <a:extLst/>
+          </a:blip>
+          <a:stretch>
+            <a:fillRect/>
+          </a:stretch>
+        </p:blipFill>
+        <p:spPr>
+          <a:xfrm>
+            <a:off x="0" y="0"/>
+            <a:ext cx="13004800" cy="1778000"/>
+          </a:xfrm>
+          <a:prstGeom prst="rect">
+            <a:avLst/>
+          </a:prstGeom>
+          <a:ln w="12700">
+            <a:miter lim="400000"/>
+          </a:ln>
+        </p:spPr>
+      </p:pic>
       <p:sp>
         <p:nvSpPr>
-          <p:cNvPr id="157" name="Stakeholder Value Impact"/>
+          <p:cNvPr id="174" name="Platform Maturity Is Already Strong"/>
           <p:cNvSpPr txBox="1"/>
           <p:nvPr/>
         </p:nvSpPr>
         <p:spPr>
           <a:xfrm>
-            <a:off x="761999" y="475589"/>
-            <a:ext cx="11430001" cy="572822"/>
+            <a:off x="685800" y="595808"/>
+            <a:ext cx="11684000" cy="611784"/>
           </a:xfrm>
           <a:prstGeom prst="rect">
             <a:avLst/>
@@ -5615,25 +6977,37 @@
           <a:bodyPr lIns="50800" tIns="50800" rIns="50800" bIns="50800" anchor="ctr">
             <a:spAutoFit/>
           </a:bodyPr>
-          <a:lstStyle/>
+          <a:lstStyle>
+            <a:lvl1pPr>
+              <a:defRPr sz="4000">
+                <a:solidFill>
+                  <a:srgbClr val="FFFFFF"/>
+                </a:solidFill>
+                <a:latin typeface="Calibri"/>
+                <a:ea typeface="Calibri"/>
+                <a:cs typeface="Calibri"/>
+                <a:sym typeface="Calibri"/>
+              </a:defRPr>
+            </a:lvl1pPr>
+          </a:lstStyle>
           <a:p>
             <a:pPr/>
             <a:r>
-              <a:t>Stakeholder Value Impact</a:t>
+              <a:t>Platform Maturity Is Already Strong</a:t>
             </a:r>
           </a:p>
         </p:txBody>
       </p:sp>
       <p:sp>
         <p:nvSpPr>
-          <p:cNvPr id="158" name="Illustrative value score by role (higher is better)"/>
+          <p:cNvPr id="175" name="Current product status across capability areas"/>
           <p:cNvSpPr txBox="1"/>
           <p:nvPr/>
         </p:nvSpPr>
         <p:spPr>
           <a:xfrm>
-            <a:off x="762000" y="1116939"/>
-            <a:ext cx="11430000" cy="572822"/>
+            <a:off x="889000" y="2054789"/>
+            <a:ext cx="11226800" cy="360822"/>
           </a:xfrm>
           <a:prstGeom prst="rect">
             <a:avLst/>
@@ -5651,28 +7025,37 @@
           <a:bodyPr lIns="50800" tIns="50800" rIns="50800" bIns="50800" anchor="ctr">
             <a:spAutoFit/>
           </a:bodyPr>
-          <a:lstStyle/>
+          <a:lstStyle>
+            <a:lvl1pPr>
+              <a:defRPr sz="1800">
+                <a:latin typeface="Arial"/>
+                <a:ea typeface="Arial"/>
+                <a:cs typeface="Arial"/>
+                <a:sym typeface="Arial"/>
+              </a:defRPr>
+            </a:lvl1pPr>
+          </a:lstStyle>
           <a:p>
             <a:pPr/>
             <a:r>
-              <a:t>Illustrative value score by role (higher is better)</a:t>
+              <a:t>Current product status across capability areas</a:t>
             </a:r>
           </a:p>
         </p:txBody>
       </p:sp>
       <p:graphicFrame>
         <p:nvGraphicFramePr>
-          <p:cNvPr id="159" name="2D Bar Chart"/>
+          <p:cNvPr id="176" name="2D Pie Chart"/>
           <p:cNvGraphicFramePr/>
           <p:nvPr/>
         </p:nvGraphicFramePr>
         <p:xfrm>
-          <a:off x="-582282" y="1569923"/>
-          <a:ext cx="12632652" cy="6274854"/>
+          <a:off x="1206500" y="2692400"/>
+          <a:ext cx="5461000" cy="5461000"/>
         </p:xfrm>
         <a:graphic xmlns:a="http://schemas.openxmlformats.org/drawingml/2006/main">
           <a:graphicData uri="http://schemas.openxmlformats.org/drawingml/2006/chart">
-            <c:chart xmlns:c="http://schemas.openxmlformats.org/drawingml/2006/chart" r:id="rId2"/>
+            <c:chart xmlns:c="http://schemas.openxmlformats.org/drawingml/2006/chart" r:id="rId3"/>
           </a:graphicData>
         </a:graphic>
       </p:graphicFrame>
@@ -5702,16 +7085,45 @@
           <a:chExt cx="0" cy="0"/>
         </a:xfrm>
       </p:grpSpPr>
+      <p:pic>
+        <p:nvPicPr>
+          <p:cNvPr id="178" name="header_bar.png" descr="header_bar.png"/>
+          <p:cNvPicPr>
+            <a:picLocks noChangeAspect="1"/>
+          </p:cNvPicPr>
+          <p:nvPr/>
+        </p:nvPicPr>
+        <p:blipFill>
+          <a:blip r:embed="rId2">
+            <a:extLst/>
+          </a:blip>
+          <a:stretch>
+            <a:fillRect/>
+          </a:stretch>
+        </p:blipFill>
+        <p:spPr>
+          <a:xfrm>
+            <a:off x="0" y="0"/>
+            <a:ext cx="13004800" cy="1778000"/>
+          </a:xfrm>
+          <a:prstGeom prst="rect">
+            <a:avLst/>
+          </a:prstGeom>
+          <a:ln w="12700">
+            <a:miter lim="400000"/>
+          </a:ln>
+        </p:spPr>
+      </p:pic>
       <p:sp>
         <p:nvSpPr>
-          <p:cNvPr id="161" name="90-Day Adoption Path"/>
+          <p:cNvPr id="179" name="Reliability Commitments Protect Trust"/>
           <p:cNvSpPr txBox="1"/>
           <p:nvPr/>
         </p:nvSpPr>
         <p:spPr>
           <a:xfrm>
-            <a:off x="762000" y="475589"/>
-            <a:ext cx="11430001" cy="572822"/>
+            <a:off x="685800" y="595808"/>
+            <a:ext cx="11684000" cy="611784"/>
           </a:xfrm>
           <a:prstGeom prst="rect">
             <a:avLst/>
@@ -5729,25 +7141,37 @@
           <a:bodyPr lIns="50800" tIns="50800" rIns="50800" bIns="50800" anchor="ctr">
             <a:spAutoFit/>
           </a:bodyPr>
-          <a:lstStyle/>
+          <a:lstStyle>
+            <a:lvl1pPr>
+              <a:defRPr sz="4000">
+                <a:solidFill>
+                  <a:srgbClr val="FFFFFF"/>
+                </a:solidFill>
+                <a:latin typeface="Calibri"/>
+                <a:ea typeface="Calibri"/>
+                <a:cs typeface="Calibri"/>
+                <a:sym typeface="Calibri"/>
+              </a:defRPr>
+            </a:lvl1pPr>
+          </a:lstStyle>
           <a:p>
             <a:pPr/>
             <a:r>
-              <a:t>90-Day Adoption Path</a:t>
+              <a:t>Reliability Commitments Protect Trust</a:t>
             </a:r>
           </a:p>
         </p:txBody>
       </p:sp>
       <p:sp>
         <p:nvSpPr>
-          <p:cNvPr id="162" name="Target tenant coverage after rollout kickoff"/>
+          <p:cNvPr id="180" name="SLA and freshness commitments that protect stakeholder trust"/>
           <p:cNvSpPr txBox="1"/>
           <p:nvPr/>
         </p:nvSpPr>
         <p:spPr>
           <a:xfrm>
-            <a:off x="762000" y="1116939"/>
-            <a:ext cx="11430000" cy="572822"/>
+            <a:off x="888999" y="1813489"/>
+            <a:ext cx="11226801" cy="360822"/>
           </a:xfrm>
           <a:prstGeom prst="rect">
             <a:avLst/>
@@ -5765,28 +7189,37 @@
           <a:bodyPr lIns="50800" tIns="50800" rIns="50800" bIns="50800" anchor="ctr">
             <a:spAutoFit/>
           </a:bodyPr>
-          <a:lstStyle/>
+          <a:lstStyle>
+            <a:lvl1pPr>
+              <a:defRPr sz="1800">
+                <a:latin typeface="Arial"/>
+                <a:ea typeface="Arial"/>
+                <a:cs typeface="Arial"/>
+                <a:sym typeface="Arial"/>
+              </a:defRPr>
+            </a:lvl1pPr>
+          </a:lstStyle>
           <a:p>
             <a:pPr/>
             <a:r>
-              <a:t>Target tenant coverage after rollout kickoff</a:t>
+              <a:t>SLA and freshness commitments that protect stakeholder trust</a:t>
             </a:r>
           </a:p>
         </p:txBody>
       </p:sp>
       <p:graphicFrame>
         <p:nvGraphicFramePr>
-          <p:cNvPr id="163" name="2D Line Chart"/>
+          <p:cNvPr id="181" name="2D Column Chart"/>
           <p:cNvGraphicFramePr/>
           <p:nvPr/>
         </p:nvGraphicFramePr>
         <p:xfrm>
-          <a:off x="353988" y="1569923"/>
-          <a:ext cx="11900763" cy="6274854"/>
+          <a:off x="417488" y="2357323"/>
+          <a:ext cx="11380812" cy="6274854"/>
         </p:xfrm>
         <a:graphic xmlns:a="http://schemas.openxmlformats.org/drawingml/2006/main">
           <a:graphicData uri="http://schemas.openxmlformats.org/drawingml/2006/chart">
-            <c:chart xmlns:c="http://schemas.openxmlformats.org/drawingml/2006/chart" r:id="rId2"/>
+            <c:chart xmlns:c="http://schemas.openxmlformats.org/drawingml/2006/chart" r:id="rId3"/>
           </a:graphicData>
         </a:graphic>
       </p:graphicFrame>
@@ -5816,76 +7249,144 @@
           <a:chExt cx="0" cy="0"/>
         </a:xfrm>
       </p:grpSpPr>
-      <p:sp>
-        <p:nvSpPr>
-          <p:cNvPr id="165" name="Security and Governance"/>
-          <p:cNvSpPr txBox="1"/>
-          <p:nvPr>
-            <p:ph type="title"/>
-          </p:nvPr>
-        </p:nvSpPr>
+      <p:pic>
+        <p:nvPicPr>
+          <p:cNvPr id="183" name="header_bar.png" descr="header_bar.png"/>
+          <p:cNvPicPr>
+            <a:picLocks noChangeAspect="1"/>
+          </p:cNvPicPr>
+          <p:nvPr/>
+        </p:nvPicPr>
+        <p:blipFill>
+          <a:blip r:embed="rId2">
+            <a:extLst/>
+          </a:blip>
+          <a:stretch>
+            <a:fillRect/>
+          </a:stretch>
+        </p:blipFill>
         <p:spPr>
+          <a:xfrm>
+            <a:off x="0" y="0"/>
+            <a:ext cx="13004800" cy="1778000"/>
+          </a:xfrm>
           <a:prstGeom prst="rect">
             <a:avLst/>
           </a:prstGeom>
+          <a:ln w="12700">
+            <a:miter lim="400000"/>
+          </a:ln>
+        </p:spPr>
+      </p:pic>
+      <p:sp>
+        <p:nvSpPr>
+          <p:cNvPr id="184" name="Impact Is Broad Across Stakeholder Groups"/>
+          <p:cNvSpPr txBox="1"/>
+          <p:nvPr/>
+        </p:nvSpPr>
+        <p:spPr>
+          <a:xfrm>
+            <a:off x="685800" y="595808"/>
+            <a:ext cx="11684000" cy="611784"/>
+          </a:xfrm>
+          <a:prstGeom prst="rect">
+            <a:avLst/>
+          </a:prstGeom>
+          <a:ln w="12700">
+            <a:miter lim="400000"/>
+          </a:ln>
+          <a:extLst>
+            <a:ext uri="{C572A759-6A51-4108-AA02-DFA0A04FC94B}">
+              <ma14:wrappingTextBoxFlag xmlns:ma14="http://schemas.microsoft.com/office/mac/drawingml/2011/main" val="1"/>
+            </a:ext>
+          </a:extLst>
         </p:spPr>
         <p:txBody>
-          <a:bodyPr/>
+          <a:bodyPr lIns="50800" tIns="50800" rIns="50800" bIns="50800" anchor="ctr">
+            <a:spAutoFit/>
+          </a:bodyPr>
           <a:lstStyle>
-            <a:lvl1pPr defTabSz="537463">
-              <a:defRPr sz="7360"/>
+            <a:lvl1pPr>
+              <a:defRPr sz="4000">
+                <a:solidFill>
+                  <a:srgbClr val="FFFFFF"/>
+                </a:solidFill>
+                <a:latin typeface="Calibri"/>
+                <a:ea typeface="Calibri"/>
+                <a:cs typeface="Calibri"/>
+                <a:sym typeface="Calibri"/>
+              </a:defRPr>
             </a:lvl1pPr>
           </a:lstStyle>
           <a:p>
             <a:pPr/>
             <a:r>
-              <a:t>Security and Governance</a:t>
+              <a:t>Impact Is Broad Across Stakeholder Groups</a:t>
             </a:r>
           </a:p>
         </p:txBody>
       </p:sp>
       <p:sp>
         <p:nvSpPr>
-          <p:cNvPr id="166" name="Aggregated advertising metrics only (no user-level PII)…"/>
+          <p:cNvPr id="185" name="Illustrative value intensity by role"/>
           <p:cNvSpPr txBox="1"/>
-          <p:nvPr>
-            <p:ph type="body" idx="1"/>
-          </p:nvPr>
+          <p:nvPr/>
         </p:nvSpPr>
         <p:spPr>
+          <a:xfrm>
+            <a:off x="888999" y="2054789"/>
+            <a:ext cx="11226801" cy="360822"/>
+          </a:xfrm>
           <a:prstGeom prst="rect">
             <a:avLst/>
           </a:prstGeom>
+          <a:ln w="12700">
+            <a:miter lim="400000"/>
+          </a:ln>
+          <a:extLst>
+            <a:ext uri="{C572A759-6A51-4108-AA02-DFA0A04FC94B}">
+              <ma14:wrappingTextBoxFlag xmlns:ma14="http://schemas.microsoft.com/office/mac/drawingml/2011/main" val="1"/>
+            </a:ext>
+          </a:extLst>
         </p:spPr>
         <p:txBody>
-          <a:bodyPr/>
-          <a:lstStyle/>
+          <a:bodyPr lIns="50800" tIns="50800" rIns="50800" bIns="50800" anchor="ctr">
+            <a:spAutoFit/>
+          </a:bodyPr>
+          <a:lstStyle>
+            <a:lvl1pPr>
+              <a:defRPr sz="1800">
+                <a:latin typeface="Arial"/>
+                <a:ea typeface="Arial"/>
+                <a:cs typeface="Arial"/>
+                <a:sym typeface="Arial"/>
+              </a:defRPr>
+            </a:lvl1pPr>
+          </a:lstStyle>
           <a:p>
             <a:pPr/>
             <a:r>
-              <a:t>Aggregated advertising metrics only (no user-level PII)</a:t>
-            </a:r>
-          </a:p>
-          <a:p>
-            <a:pPr/>
-            <a:r>
-              <a:t>Per-tenant secret encryption with AES-GCM and KMS-backed key strategy</a:t>
-            </a:r>
-          </a:p>
-          <a:p>
-            <a:pPr/>
-            <a:r>
-              <a:t>Tenant isolation guardrails enforced across ingestion, API, and UI</a:t>
-            </a:r>
-          </a:p>
-          <a:p>
-            <a:pPr/>
-            <a:r>
-              <a:t>Structured telemetry for incident triage and auditability</a:t>
+              <a:t>Illustrative value intensity by role</a:t>
             </a:r>
           </a:p>
         </p:txBody>
       </p:sp>
+      <p:graphicFrame>
+        <p:nvGraphicFramePr>
+          <p:cNvPr id="186" name="2D Bar Chart"/>
+          <p:cNvGraphicFramePr/>
+          <p:nvPr/>
+        </p:nvGraphicFramePr>
+        <p:xfrm>
+          <a:off x="-518782" y="2357323"/>
+          <a:ext cx="12556452" cy="6274854"/>
+        </p:xfrm>
+        <a:graphic xmlns:a="http://schemas.openxmlformats.org/drawingml/2006/main">
+          <a:graphicData uri="http://schemas.openxmlformats.org/drawingml/2006/chart">
+            <c:chart xmlns:c="http://schemas.openxmlformats.org/drawingml/2006/chart" r:id="rId3"/>
+          </a:graphicData>
+        </a:graphic>
+      </p:graphicFrame>
     </p:spTree>
   </p:cSld>
   <p:clrMapOvr>

</xml_diff>